<commit_message>
fix cyfi445 lab 7
</commit_message>
<xml_diff>
--- a/CYFI445/lectures/05_binary_classification_1_to_1/binary_classification.pptx
+++ b/CYFI445/lectures/05_binary_classification_1_to_1/binary_classification.pptx
@@ -124,13 +124,178 @@
 <file path=ppt/revisionInfo.xml><?xml version="1.0" encoding="utf-8"?>
 <p1510:revInfo xmlns:a="http://schemas.openxmlformats.org/drawingml/2006/main" xmlns:r="http://schemas.openxmlformats.org/officeDocument/2006/relationships" xmlns:p1510="http://schemas.microsoft.com/office/powerpoint/2015/10/main">
   <p1510:revLst>
-    <p1510:client id="{825966BF-7E70-4B40-8404-AC60AE88AAC3}" v="43" dt="2025-06-02T15:25:42.082"/>
+    <p1510:client id="{825966BF-7E70-4B40-8404-AC60AE88AAC3}" v="49" dt="2025-10-02T13:04:20.355"/>
   </p1510:revLst>
 </p1510:revInfo>
 </file>
 
 <file path=ppt/changesInfos/changesInfo1.xml><?xml version="1.0" encoding="utf-8"?>
 <pc:chgInfo xmlns:a="http://schemas.openxmlformats.org/drawingml/2006/main" xmlns:r="http://schemas.openxmlformats.org/officeDocument/2006/relationships" xmlns:ac="http://schemas.microsoft.com/office/drawing/2013/main/command" xmlns:pc="http://schemas.microsoft.com/office/powerpoint/2013/main/command">
+  <pc:docChgLst>
+    <pc:chgData name="Weifeng Xu" userId="e7aed605-a3dd-4d5a-a692-a87037af107b" providerId="ADAL" clId="{F99F8FFF-BA20-43EA-924B-4DF5D2A785F3}"/>
+    <pc:docChg chg="custSel modSld">
+      <pc:chgData name="Weifeng Xu" userId="e7aed605-a3dd-4d5a-a692-a87037af107b" providerId="ADAL" clId="{F99F8FFF-BA20-43EA-924B-4DF5D2A785F3}" dt="2025-10-02T13:04:20.355" v="91"/>
+      <pc:docMkLst>
+        <pc:docMk/>
+      </pc:docMkLst>
+      <pc:sldChg chg="modSp mod">
+        <pc:chgData name="Weifeng Xu" userId="e7aed605-a3dd-4d5a-a692-a87037af107b" providerId="ADAL" clId="{F99F8FFF-BA20-43EA-924B-4DF5D2A785F3}" dt="2025-10-02T12:57:41.400" v="32" actId="20577"/>
+        <pc:sldMkLst>
+          <pc:docMk/>
+          <pc:sldMk cId="1325061211" sldId="256"/>
+        </pc:sldMkLst>
+        <pc:spChg chg="mod">
+          <ac:chgData name="Weifeng Xu" userId="e7aed605-a3dd-4d5a-a692-a87037af107b" providerId="ADAL" clId="{F99F8FFF-BA20-43EA-924B-4DF5D2A785F3}" dt="2025-10-02T12:57:41.400" v="32" actId="20577"/>
+          <ac:spMkLst>
+            <pc:docMk/>
+            <pc:sldMk cId="1325061211" sldId="256"/>
+            <ac:spMk id="3" creationId="{00000000-0000-0000-0000-000000000000}"/>
+          </ac:spMkLst>
+        </pc:spChg>
+      </pc:sldChg>
+      <pc:sldChg chg="addSp delSp modSp mod">
+        <pc:chgData name="Weifeng Xu" userId="e7aed605-a3dd-4d5a-a692-a87037af107b" providerId="ADAL" clId="{F99F8FFF-BA20-43EA-924B-4DF5D2A785F3}" dt="2025-10-02T13:04:20.355" v="91"/>
+        <pc:sldMkLst>
+          <pc:docMk/>
+          <pc:sldMk cId="3381090855" sldId="257"/>
+        </pc:sldMkLst>
+        <pc:spChg chg="mod">
+          <ac:chgData name="Weifeng Xu" userId="e7aed605-a3dd-4d5a-a692-a87037af107b" providerId="ADAL" clId="{F99F8FFF-BA20-43EA-924B-4DF5D2A785F3}" dt="2025-10-02T12:59:43.609" v="79" actId="207"/>
+          <ac:spMkLst>
+            <pc:docMk/>
+            <pc:sldMk cId="3381090855" sldId="257"/>
+            <ac:spMk id="2" creationId="{ECB978BA-385F-B200-E683-1735D2358203}"/>
+          </ac:spMkLst>
+        </pc:spChg>
+        <pc:grpChg chg="del mod">
+          <ac:chgData name="Weifeng Xu" userId="e7aed605-a3dd-4d5a-a692-a87037af107b" providerId="ADAL" clId="{F99F8FFF-BA20-43EA-924B-4DF5D2A785F3}" dt="2025-10-02T13:01:46.131" v="87"/>
+          <ac:grpSpMkLst>
+            <pc:docMk/>
+            <pc:sldMk cId="3381090855" sldId="257"/>
+            <ac:grpSpMk id="10" creationId="{2A53F4A7-04E8-9EF5-272E-0BE8ADC18199}"/>
+          </ac:grpSpMkLst>
+        </pc:grpChg>
+        <pc:grpChg chg="mod">
+          <ac:chgData name="Weifeng Xu" userId="e7aed605-a3dd-4d5a-a692-a87037af107b" providerId="ADAL" clId="{F99F8FFF-BA20-43EA-924B-4DF5D2A785F3}" dt="2025-10-02T13:01:46.131" v="87"/>
+          <ac:grpSpMkLst>
+            <pc:docMk/>
+            <pc:sldMk cId="3381090855" sldId="257"/>
+            <ac:grpSpMk id="15" creationId="{A8923A0E-2CD8-2329-7841-5AC4DFC253EA}"/>
+          </ac:grpSpMkLst>
+        </pc:grpChg>
+        <pc:grpChg chg="mod">
+          <ac:chgData name="Weifeng Xu" userId="e7aed605-a3dd-4d5a-a692-a87037af107b" providerId="ADAL" clId="{F99F8FFF-BA20-43EA-924B-4DF5D2A785F3}" dt="2025-10-02T13:04:20.355" v="91"/>
+          <ac:grpSpMkLst>
+            <pc:docMk/>
+            <pc:sldMk cId="3381090855" sldId="257"/>
+            <ac:grpSpMk id="19" creationId="{184B4CA9-6B41-4477-C78C-899DECF3BE93}"/>
+          </ac:grpSpMkLst>
+        </pc:grpChg>
+        <pc:inkChg chg="add">
+          <ac:chgData name="Weifeng Xu" userId="e7aed605-a3dd-4d5a-a692-a87037af107b" providerId="ADAL" clId="{F99F8FFF-BA20-43EA-924B-4DF5D2A785F3}" dt="2025-10-02T13:01:30.764" v="80" actId="9405"/>
+          <ac:inkMkLst>
+            <pc:docMk/>
+            <pc:sldMk cId="3381090855" sldId="257"/>
+            <ac:inkMk id="4" creationId="{9C2440D9-6E2E-6089-2909-9E75D7C4526D}"/>
+          </ac:inkMkLst>
+        </pc:inkChg>
+        <pc:inkChg chg="add">
+          <ac:chgData name="Weifeng Xu" userId="e7aed605-a3dd-4d5a-a692-a87037af107b" providerId="ADAL" clId="{F99F8FFF-BA20-43EA-924B-4DF5D2A785F3}" dt="2025-10-02T13:01:35.697" v="81" actId="9405"/>
+          <ac:inkMkLst>
+            <pc:docMk/>
+            <pc:sldMk cId="3381090855" sldId="257"/>
+            <ac:inkMk id="5" creationId="{8595E725-A727-D1B9-3E31-0FAC9674EE4A}"/>
+          </ac:inkMkLst>
+        </pc:inkChg>
+        <pc:inkChg chg="add mod">
+          <ac:chgData name="Weifeng Xu" userId="e7aed605-a3dd-4d5a-a692-a87037af107b" providerId="ADAL" clId="{F99F8FFF-BA20-43EA-924B-4DF5D2A785F3}" dt="2025-10-02T13:01:46.131" v="87"/>
+          <ac:inkMkLst>
+            <pc:docMk/>
+            <pc:sldMk cId="3381090855" sldId="257"/>
+            <ac:inkMk id="6" creationId="{31468C0A-227B-698D-9452-4265790B3758}"/>
+          </ac:inkMkLst>
+        </pc:inkChg>
+        <pc:inkChg chg="add mod">
+          <ac:chgData name="Weifeng Xu" userId="e7aed605-a3dd-4d5a-a692-a87037af107b" providerId="ADAL" clId="{F99F8FFF-BA20-43EA-924B-4DF5D2A785F3}" dt="2025-10-02T13:01:46.131" v="87"/>
+          <ac:inkMkLst>
+            <pc:docMk/>
+            <pc:sldMk cId="3381090855" sldId="257"/>
+            <ac:inkMk id="8" creationId="{68E4FE6D-3D86-CD72-3B5F-24F1F1666FC2}"/>
+          </ac:inkMkLst>
+        </pc:inkChg>
+        <pc:inkChg chg="add mod">
+          <ac:chgData name="Weifeng Xu" userId="e7aed605-a3dd-4d5a-a692-a87037af107b" providerId="ADAL" clId="{F99F8FFF-BA20-43EA-924B-4DF5D2A785F3}" dt="2025-10-02T13:01:46.131" v="87"/>
+          <ac:inkMkLst>
+            <pc:docMk/>
+            <pc:sldMk cId="3381090855" sldId="257"/>
+            <ac:inkMk id="12" creationId="{DA552570-154F-3A62-388D-8D0DEB001008}"/>
+          </ac:inkMkLst>
+        </pc:inkChg>
+        <pc:inkChg chg="add mod">
+          <ac:chgData name="Weifeng Xu" userId="e7aed605-a3dd-4d5a-a692-a87037af107b" providerId="ADAL" clId="{F99F8FFF-BA20-43EA-924B-4DF5D2A785F3}" dt="2025-10-02T13:01:46.131" v="87"/>
+          <ac:inkMkLst>
+            <pc:docMk/>
+            <pc:sldMk cId="3381090855" sldId="257"/>
+            <ac:inkMk id="14" creationId="{C6D5C2EE-6613-1CFF-8BA2-0585FB184FEF}"/>
+          </ac:inkMkLst>
+        </pc:inkChg>
+        <pc:inkChg chg="add">
+          <ac:chgData name="Weifeng Xu" userId="e7aed605-a3dd-4d5a-a692-a87037af107b" providerId="ADAL" clId="{F99F8FFF-BA20-43EA-924B-4DF5D2A785F3}" dt="2025-10-02T13:04:13.874" v="88" actId="9405"/>
+          <ac:inkMkLst>
+            <pc:docMk/>
+            <pc:sldMk cId="3381090855" sldId="257"/>
+            <ac:inkMk id="16" creationId="{7AEEF1F1-BF07-0208-02F7-12EDE77EBF4F}"/>
+          </ac:inkMkLst>
+        </pc:inkChg>
+        <pc:inkChg chg="add mod">
+          <ac:chgData name="Weifeng Xu" userId="e7aed605-a3dd-4d5a-a692-a87037af107b" providerId="ADAL" clId="{F99F8FFF-BA20-43EA-924B-4DF5D2A785F3}" dt="2025-10-02T13:04:20.355" v="91"/>
+          <ac:inkMkLst>
+            <pc:docMk/>
+            <pc:sldMk cId="3381090855" sldId="257"/>
+            <ac:inkMk id="17" creationId="{598177DD-A50C-2191-0906-A8AEE8D72AA9}"/>
+          </ac:inkMkLst>
+        </pc:inkChg>
+        <pc:inkChg chg="add mod">
+          <ac:chgData name="Weifeng Xu" userId="e7aed605-a3dd-4d5a-a692-a87037af107b" providerId="ADAL" clId="{F99F8FFF-BA20-43EA-924B-4DF5D2A785F3}" dt="2025-10-02T13:04:20.355" v="91"/>
+          <ac:inkMkLst>
+            <pc:docMk/>
+            <pc:sldMk cId="3381090855" sldId="257"/>
+            <ac:inkMk id="18" creationId="{6E987ADE-1C05-DB61-A6DB-905AD6AE3B1C}"/>
+          </ac:inkMkLst>
+        </pc:inkChg>
+      </pc:sldChg>
+      <pc:sldChg chg="modSp mod">
+        <pc:chgData name="Weifeng Xu" userId="e7aed605-a3dd-4d5a-a692-a87037af107b" providerId="ADAL" clId="{F99F8FFF-BA20-43EA-924B-4DF5D2A785F3}" dt="2025-10-02T12:56:44.955" v="8" actId="207"/>
+        <pc:sldMkLst>
+          <pc:docMk/>
+          <pc:sldMk cId="1137577100" sldId="259"/>
+        </pc:sldMkLst>
+        <pc:spChg chg="mod">
+          <ac:chgData name="Weifeng Xu" userId="e7aed605-a3dd-4d5a-a692-a87037af107b" providerId="ADAL" clId="{F99F8FFF-BA20-43EA-924B-4DF5D2A785F3}" dt="2025-10-02T12:56:44.955" v="8" actId="207"/>
+          <ac:spMkLst>
+            <pc:docMk/>
+            <pc:sldMk cId="1137577100" sldId="259"/>
+            <ac:spMk id="2" creationId="{DABE75DE-FCA2-FD6C-4D89-82A7464EC589}"/>
+          </ac:spMkLst>
+        </pc:spChg>
+      </pc:sldChg>
+      <pc:sldChg chg="modSp mod">
+        <pc:chgData name="Weifeng Xu" userId="e7aed605-a3dd-4d5a-a692-a87037af107b" providerId="ADAL" clId="{F99F8FFF-BA20-43EA-924B-4DF5D2A785F3}" dt="2025-09-24T14:00:00.956" v="0" actId="14100"/>
+        <pc:sldMkLst>
+          <pc:docMk/>
+          <pc:sldMk cId="735738061" sldId="262"/>
+        </pc:sldMkLst>
+        <pc:spChg chg="mod">
+          <ac:chgData name="Weifeng Xu" userId="e7aed605-a3dd-4d5a-a692-a87037af107b" providerId="ADAL" clId="{F99F8FFF-BA20-43EA-924B-4DF5D2A785F3}" dt="2025-09-24T14:00:00.956" v="0" actId="14100"/>
+          <ac:spMkLst>
+            <pc:docMk/>
+            <pc:sldMk cId="735738061" sldId="262"/>
+            <ac:spMk id="9" creationId="{C0562CB6-173F-C0FB-2371-22622B37ED7F}"/>
+          </ac:spMkLst>
+        </pc:spChg>
+      </pc:sldChg>
+    </pc:docChg>
+  </pc:docChgLst>
   <pc:docChgLst>
     <pc:chgData name="Weifeng Xu" userId="e7aed605-a3dd-4d5a-a692-a87037af107b" providerId="ADAL" clId="{825966BF-7E70-4B40-8404-AC60AE88AAC3}"/>
     <pc:docChg chg="undo redo custSel addSld delSld modSld">
@@ -144,22 +309,6 @@
           <pc:docMk/>
           <pc:sldMk cId="1325061211" sldId="256"/>
         </pc:sldMkLst>
-        <pc:spChg chg="mod">
-          <ac:chgData name="Weifeng Xu" userId="e7aed605-a3dd-4d5a-a692-a87037af107b" providerId="ADAL" clId="{825966BF-7E70-4B40-8404-AC60AE88AAC3}" dt="2025-04-30T13:48:07.631" v="20" actId="20577"/>
-          <ac:spMkLst>
-            <pc:docMk/>
-            <pc:sldMk cId="1325061211" sldId="256"/>
-            <ac:spMk id="2" creationId="{00000000-0000-0000-0000-000000000000}"/>
-          </ac:spMkLst>
-        </pc:spChg>
-        <pc:spChg chg="mod">
-          <ac:chgData name="Weifeng Xu" userId="e7aed605-a3dd-4d5a-a692-a87037af107b" providerId="ADAL" clId="{825966BF-7E70-4B40-8404-AC60AE88AAC3}" dt="2025-04-30T13:48:11.174" v="21" actId="6549"/>
-          <ac:spMkLst>
-            <pc:docMk/>
-            <pc:sldMk cId="1325061211" sldId="256"/>
-            <ac:spMk id="3" creationId="{00000000-0000-0000-0000-000000000000}"/>
-          </ac:spMkLst>
-        </pc:spChg>
       </pc:sldChg>
       <pc:sldChg chg="del">
         <pc:chgData name="Weifeng Xu" userId="e7aed605-a3dd-4d5a-a692-a87037af107b" providerId="ADAL" clId="{825966BF-7E70-4B40-8404-AC60AE88AAC3}" dt="2025-04-30T13:48:20.285" v="22" actId="47"/>
@@ -174,62 +323,6 @@
           <pc:docMk/>
           <pc:sldMk cId="3381090855" sldId="257"/>
         </pc:sldMkLst>
-        <pc:spChg chg="mod ord">
-          <ac:chgData name="Weifeng Xu" userId="e7aed605-a3dd-4d5a-a692-a87037af107b" providerId="ADAL" clId="{825966BF-7E70-4B40-8404-AC60AE88AAC3}" dt="2025-04-30T13:48:39.162" v="41" actId="700"/>
-          <ac:spMkLst>
-            <pc:docMk/>
-            <pc:sldMk cId="3381090855" sldId="257"/>
-            <ac:spMk id="2" creationId="{ECB978BA-385F-B200-E683-1735D2358203}"/>
-          </ac:spMkLst>
-        </pc:spChg>
-        <pc:spChg chg="add mod">
-          <ac:chgData name="Weifeng Xu" userId="e7aed605-a3dd-4d5a-a692-a87037af107b" providerId="ADAL" clId="{825966BF-7E70-4B40-8404-AC60AE88AAC3}" dt="2025-04-30T13:51:08.180" v="77" actId="1076"/>
-          <ac:spMkLst>
-            <pc:docMk/>
-            <pc:sldMk cId="3381090855" sldId="257"/>
-            <ac:spMk id="11" creationId="{05B53276-2B38-B662-945B-2E545759D57F}"/>
-          </ac:spMkLst>
-        </pc:spChg>
-        <pc:spChg chg="add">
-          <ac:chgData name="Weifeng Xu" userId="e7aed605-a3dd-4d5a-a692-a87037af107b" providerId="ADAL" clId="{825966BF-7E70-4B40-8404-AC60AE88AAC3}" dt="2025-04-30T13:58:16.050" v="95" actId="11529"/>
-          <ac:spMkLst>
-            <pc:docMk/>
-            <pc:sldMk cId="3381090855" sldId="257"/>
-            <ac:spMk id="13" creationId="{91D20827-D7D5-7431-4309-0294CFD46633}"/>
-          </ac:spMkLst>
-        </pc:spChg>
-        <pc:picChg chg="add mod">
-          <ac:chgData name="Weifeng Xu" userId="e7aed605-a3dd-4d5a-a692-a87037af107b" providerId="ADAL" clId="{825966BF-7E70-4B40-8404-AC60AE88AAC3}" dt="2025-06-02T14:51:24.845" v="852" actId="14100"/>
-          <ac:picMkLst>
-            <pc:docMk/>
-            <pc:sldMk cId="3381090855" sldId="257"/>
-            <ac:picMk id="3" creationId="{919F024C-A44F-C27E-077F-F1032EBAC2AB}"/>
-          </ac:picMkLst>
-        </pc:picChg>
-        <pc:picChg chg="add mod">
-          <ac:chgData name="Weifeng Xu" userId="e7aed605-a3dd-4d5a-a692-a87037af107b" providerId="ADAL" clId="{825966BF-7E70-4B40-8404-AC60AE88AAC3}" dt="2025-04-30T13:49:19.830" v="48" actId="14100"/>
-          <ac:picMkLst>
-            <pc:docMk/>
-            <pc:sldMk cId="3381090855" sldId="257"/>
-            <ac:picMk id="7" creationId="{D9B79E3F-B70A-67B1-36C6-5AF6DA7866B1}"/>
-          </ac:picMkLst>
-        </pc:picChg>
-        <pc:picChg chg="add del mod">
-          <ac:chgData name="Weifeng Xu" userId="e7aed605-a3dd-4d5a-a692-a87037af107b" providerId="ADAL" clId="{825966BF-7E70-4B40-8404-AC60AE88AAC3}" dt="2025-06-02T14:51:17.822" v="848" actId="478"/>
-          <ac:picMkLst>
-            <pc:docMk/>
-            <pc:sldMk cId="3381090855" sldId="257"/>
-            <ac:picMk id="12" creationId="{21527139-2C15-33AE-1B3F-896B88992CB0}"/>
-          </ac:picMkLst>
-        </pc:picChg>
-        <pc:inkChg chg="add">
-          <ac:chgData name="Weifeng Xu" userId="e7aed605-a3dd-4d5a-a692-a87037af107b" providerId="ADAL" clId="{825966BF-7E70-4B40-8404-AC60AE88AAC3}" dt="2025-04-30T13:50:07.299" v="51"/>
-          <ac:inkMkLst>
-            <pc:docMk/>
-            <pc:sldMk cId="3381090855" sldId="257"/>
-            <ac:inkMk id="9" creationId="{9D460BBD-2901-C316-158F-65B3E0DE13BA}"/>
-          </ac:inkMkLst>
-        </pc:inkChg>
       </pc:sldChg>
       <pc:sldChg chg="addSp delSp modSp new mod">
         <pc:chgData name="Weifeng Xu" userId="e7aed605-a3dd-4d5a-a692-a87037af107b" providerId="ADAL" clId="{825966BF-7E70-4B40-8404-AC60AE88AAC3}" dt="2025-05-02T00:06:02.006" v="680" actId="14100"/>
@@ -237,110 +330,6 @@
           <pc:docMk/>
           <pc:sldMk cId="2204530230" sldId="258"/>
         </pc:sldMkLst>
-        <pc:spChg chg="mod">
-          <ac:chgData name="Weifeng Xu" userId="e7aed605-a3dd-4d5a-a692-a87037af107b" providerId="ADAL" clId="{825966BF-7E70-4B40-8404-AC60AE88AAC3}" dt="2025-04-30T14:06:14.369" v="184" actId="6549"/>
-          <ac:spMkLst>
-            <pc:docMk/>
-            <pc:sldMk cId="2204530230" sldId="258"/>
-            <ac:spMk id="2" creationId="{B7D803A0-7752-D061-C3A3-6C8DB69EB73E}"/>
-          </ac:spMkLst>
-        </pc:spChg>
-        <pc:spChg chg="add mod">
-          <ac:chgData name="Weifeng Xu" userId="e7aed605-a3dd-4d5a-a692-a87037af107b" providerId="ADAL" clId="{825966BF-7E70-4B40-8404-AC60AE88AAC3}" dt="2025-05-01T22:51:44.780" v="672" actId="20577"/>
-          <ac:spMkLst>
-            <pc:docMk/>
-            <pc:sldMk cId="2204530230" sldId="258"/>
-            <ac:spMk id="19" creationId="{9CC6794E-473C-5D2B-3FB4-E9D093375630}"/>
-          </ac:spMkLst>
-        </pc:spChg>
-        <pc:spChg chg="add mod">
-          <ac:chgData name="Weifeng Xu" userId="e7aed605-a3dd-4d5a-a692-a87037af107b" providerId="ADAL" clId="{825966BF-7E70-4B40-8404-AC60AE88AAC3}" dt="2025-05-02T00:04:11.862" v="674" actId="1076"/>
-          <ac:spMkLst>
-            <pc:docMk/>
-            <pc:sldMk cId="2204530230" sldId="258"/>
-            <ac:spMk id="20" creationId="{10C678F3-5C0E-0592-F641-668EA52AE54D}"/>
-          </ac:spMkLst>
-        </pc:spChg>
-        <pc:spChg chg="add mod">
-          <ac:chgData name="Weifeng Xu" userId="e7aed605-a3dd-4d5a-a692-a87037af107b" providerId="ADAL" clId="{825966BF-7E70-4B40-8404-AC60AE88AAC3}" dt="2025-05-01T22:44:50.585" v="628" actId="1076"/>
-          <ac:spMkLst>
-            <pc:docMk/>
-            <pc:sldMk cId="2204530230" sldId="258"/>
-            <ac:spMk id="22" creationId="{E5D456AA-71B0-FEEA-2643-8FA16DC350A0}"/>
-          </ac:spMkLst>
-        </pc:spChg>
-        <pc:grpChg chg="mod">
-          <ac:chgData name="Weifeng Xu" userId="e7aed605-a3dd-4d5a-a692-a87037af107b" providerId="ADAL" clId="{825966BF-7E70-4B40-8404-AC60AE88AAC3}" dt="2025-04-30T13:59:03.183" v="114"/>
-          <ac:grpSpMkLst>
-            <pc:docMk/>
-            <pc:sldMk cId="2204530230" sldId="258"/>
-            <ac:grpSpMk id="13" creationId="{9B8CDEE3-17A3-9CA8-089F-D6BB9FA0332D}"/>
-          </ac:grpSpMkLst>
-        </pc:grpChg>
-        <pc:picChg chg="add mod">
-          <ac:chgData name="Weifeng Xu" userId="e7aed605-a3dd-4d5a-a692-a87037af107b" providerId="ADAL" clId="{825966BF-7E70-4B40-8404-AC60AE88AAC3}" dt="2025-05-02T00:06:02.006" v="680" actId="14100"/>
-          <ac:picMkLst>
-            <pc:docMk/>
-            <pc:sldMk cId="2204530230" sldId="258"/>
-            <ac:picMk id="6" creationId="{9DEAB252-93CF-4E71-03C5-F4D762D5901F}"/>
-          </ac:picMkLst>
-        </pc:picChg>
-        <pc:picChg chg="add mod">
-          <ac:chgData name="Weifeng Xu" userId="e7aed605-a3dd-4d5a-a692-a87037af107b" providerId="ADAL" clId="{825966BF-7E70-4B40-8404-AC60AE88AAC3}" dt="2025-04-30T13:58:43.750" v="101" actId="14100"/>
-          <ac:picMkLst>
-            <pc:docMk/>
-            <pc:sldMk cId="2204530230" sldId="258"/>
-            <ac:picMk id="7" creationId="{F8AC5C0A-A1A1-DF51-A7B3-0908B0916F87}"/>
-          </ac:picMkLst>
-        </pc:picChg>
-        <pc:picChg chg="add mod">
-          <ac:chgData name="Weifeng Xu" userId="e7aed605-a3dd-4d5a-a692-a87037af107b" providerId="ADAL" clId="{825966BF-7E70-4B40-8404-AC60AE88AAC3}" dt="2025-04-30T14:31:32.514" v="343" actId="1076"/>
-          <ac:picMkLst>
-            <pc:docMk/>
-            <pc:sldMk cId="2204530230" sldId="258"/>
-            <ac:picMk id="38" creationId="{5B917205-CFBB-7E48-C815-0A333710052A}"/>
-          </ac:picMkLst>
-        </pc:picChg>
-        <pc:inkChg chg="add mod">
-          <ac:chgData name="Weifeng Xu" userId="e7aed605-a3dd-4d5a-a692-a87037af107b" providerId="ADAL" clId="{825966BF-7E70-4B40-8404-AC60AE88AAC3}" dt="2025-04-30T13:57:37.938" v="88" actId="14100"/>
-          <ac:inkMkLst>
-            <pc:docMk/>
-            <pc:sldMk cId="2204530230" sldId="258"/>
-            <ac:inkMk id="8" creationId="{53165782-A0F2-0AC6-86FA-632317C2D5D2}"/>
-          </ac:inkMkLst>
-        </pc:inkChg>
-        <pc:inkChg chg="add mod">
-          <ac:chgData name="Weifeng Xu" userId="e7aed605-a3dd-4d5a-a692-a87037af107b" providerId="ADAL" clId="{825966BF-7E70-4B40-8404-AC60AE88AAC3}" dt="2025-04-30T13:59:03.183" v="114"/>
-          <ac:inkMkLst>
-            <pc:docMk/>
-            <pc:sldMk cId="2204530230" sldId="258"/>
-            <ac:inkMk id="11" creationId="{C22A1CEF-A40A-0164-892F-A7897D55EF6D}"/>
-          </ac:inkMkLst>
-        </pc:inkChg>
-        <pc:inkChg chg="add mod">
-          <ac:chgData name="Weifeng Xu" userId="e7aed605-a3dd-4d5a-a692-a87037af107b" providerId="ADAL" clId="{825966BF-7E70-4B40-8404-AC60AE88AAC3}" dt="2025-04-30T13:59:03.183" v="114"/>
-          <ac:inkMkLst>
-            <pc:docMk/>
-            <pc:sldMk cId="2204530230" sldId="258"/>
-            <ac:inkMk id="12" creationId="{D774E620-1B9B-55D0-AAC2-B3A7E927147E}"/>
-          </ac:inkMkLst>
-        </pc:inkChg>
-        <pc:inkChg chg="add">
-          <ac:chgData name="Weifeng Xu" userId="e7aed605-a3dd-4d5a-a692-a87037af107b" providerId="ADAL" clId="{825966BF-7E70-4B40-8404-AC60AE88AAC3}" dt="2025-04-30T13:59:06.936" v="115" actId="9405"/>
-          <ac:inkMkLst>
-            <pc:docMk/>
-            <pc:sldMk cId="2204530230" sldId="258"/>
-            <ac:inkMk id="14" creationId="{0B14A5E8-9CE2-193A-C3C0-8FAB19018661}"/>
-          </ac:inkMkLst>
-        </pc:inkChg>
-        <pc:inkChg chg="add">
-          <ac:chgData name="Weifeng Xu" userId="e7aed605-a3dd-4d5a-a692-a87037af107b" providerId="ADAL" clId="{825966BF-7E70-4B40-8404-AC60AE88AAC3}" dt="2025-04-30T13:59:08.401" v="116" actId="9405"/>
-          <ac:inkMkLst>
-            <pc:docMk/>
-            <pc:sldMk cId="2204530230" sldId="258"/>
-            <ac:inkMk id="15" creationId="{DCE899AC-F98E-2420-C39F-E42267DC2618}"/>
-          </ac:inkMkLst>
-        </pc:inkChg>
       </pc:sldChg>
       <pc:sldChg chg="del">
         <pc:chgData name="Weifeng Xu" userId="e7aed605-a3dd-4d5a-a692-a87037af107b" providerId="ADAL" clId="{825966BF-7E70-4B40-8404-AC60AE88AAC3}" dt="2025-04-30T13:48:20.403" v="23" actId="47"/>
@@ -355,38 +344,6 @@
           <pc:docMk/>
           <pc:sldMk cId="1137577100" sldId="259"/>
         </pc:sldMkLst>
-        <pc:spChg chg="mod">
-          <ac:chgData name="Weifeng Xu" userId="e7aed605-a3dd-4d5a-a692-a87037af107b" providerId="ADAL" clId="{825966BF-7E70-4B40-8404-AC60AE88AAC3}" dt="2025-05-02T00:15:11.452" v="847"/>
-          <ac:spMkLst>
-            <pc:docMk/>
-            <pc:sldMk cId="1137577100" sldId="259"/>
-            <ac:spMk id="2" creationId="{DABE75DE-FCA2-FD6C-4D89-82A7464EC589}"/>
-          </ac:spMkLst>
-        </pc:spChg>
-        <pc:spChg chg="add mod">
-          <ac:chgData name="Weifeng Xu" userId="e7aed605-a3dd-4d5a-a692-a87037af107b" providerId="ADAL" clId="{825966BF-7E70-4B40-8404-AC60AE88AAC3}" dt="2025-06-02T15:26:26.571" v="999" actId="14100"/>
-          <ac:spMkLst>
-            <pc:docMk/>
-            <pc:sldMk cId="1137577100" sldId="259"/>
-            <ac:spMk id="4" creationId="{A62B69E9-4F5D-575D-B1B8-87C28E9E9D86}"/>
-          </ac:spMkLst>
-        </pc:spChg>
-        <pc:spChg chg="add mod">
-          <ac:chgData name="Weifeng Xu" userId="e7aed605-a3dd-4d5a-a692-a87037af107b" providerId="ADAL" clId="{825966BF-7E70-4B40-8404-AC60AE88AAC3}" dt="2025-06-02T15:26:32.502" v="1000" actId="14100"/>
-          <ac:spMkLst>
-            <pc:docMk/>
-            <pc:sldMk cId="1137577100" sldId="259"/>
-            <ac:spMk id="5" creationId="{487F7E62-91C7-1D7C-7F16-BF937520F68F}"/>
-          </ac:spMkLst>
-        </pc:spChg>
-        <pc:picChg chg="add mod">
-          <ac:chgData name="Weifeng Xu" userId="e7aed605-a3dd-4d5a-a692-a87037af107b" providerId="ADAL" clId="{825966BF-7E70-4B40-8404-AC60AE88AAC3}" dt="2025-04-30T14:39:18.749" v="393" actId="1076"/>
-          <ac:picMkLst>
-            <pc:docMk/>
-            <pc:sldMk cId="1137577100" sldId="259"/>
-            <ac:picMk id="2050" creationId="{36C37EA7-8D07-CCE9-9177-BF8398BFDBAB}"/>
-          </ac:picMkLst>
-        </pc:picChg>
       </pc:sldChg>
       <pc:sldChg chg="del">
         <pc:chgData name="Weifeng Xu" userId="e7aed605-a3dd-4d5a-a692-a87037af107b" providerId="ADAL" clId="{825966BF-7E70-4B40-8404-AC60AE88AAC3}" dt="2025-04-30T13:48:20.548" v="24" actId="47"/>
@@ -401,110 +358,6 @@
           <pc:docMk/>
           <pc:sldMk cId="1372123449" sldId="260"/>
         </pc:sldMkLst>
-        <pc:spChg chg="mod">
-          <ac:chgData name="Weifeng Xu" userId="e7aed605-a3dd-4d5a-a692-a87037af107b" providerId="ADAL" clId="{825966BF-7E70-4B40-8404-AC60AE88AAC3}" dt="2025-04-30T15:27:06.278" v="522"/>
-          <ac:spMkLst>
-            <pc:docMk/>
-            <pc:sldMk cId="1372123449" sldId="260"/>
-            <ac:spMk id="2" creationId="{702B4550-E06F-5FFD-ABD2-A821BE70647D}"/>
-          </ac:spMkLst>
-        </pc:spChg>
-        <pc:spChg chg="add mod">
-          <ac:chgData name="Weifeng Xu" userId="e7aed605-a3dd-4d5a-a692-a87037af107b" providerId="ADAL" clId="{825966BF-7E70-4B40-8404-AC60AE88AAC3}" dt="2025-04-30T15:30:10.386" v="567" actId="1076"/>
-          <ac:spMkLst>
-            <pc:docMk/>
-            <pc:sldMk cId="1372123449" sldId="260"/>
-            <ac:spMk id="13" creationId="{974A9DD2-774E-7BFB-9488-B8760B15A66C}"/>
-          </ac:spMkLst>
-        </pc:spChg>
-        <pc:spChg chg="add mod">
-          <ac:chgData name="Weifeng Xu" userId="e7aed605-a3dd-4d5a-a692-a87037af107b" providerId="ADAL" clId="{825966BF-7E70-4B40-8404-AC60AE88AAC3}" dt="2025-04-30T15:30:08.410" v="566" actId="14100"/>
-          <ac:spMkLst>
-            <pc:docMk/>
-            <pc:sldMk cId="1372123449" sldId="260"/>
-            <ac:spMk id="14" creationId="{82743B66-1284-AC13-BE2C-84065ED88AA1}"/>
-          </ac:spMkLst>
-        </pc:spChg>
-        <pc:spChg chg="add mod">
-          <ac:chgData name="Weifeng Xu" userId="e7aed605-a3dd-4d5a-a692-a87037af107b" providerId="ADAL" clId="{825966BF-7E70-4B40-8404-AC60AE88AAC3}" dt="2025-04-30T15:35:05.283" v="599" actId="207"/>
-          <ac:spMkLst>
-            <pc:docMk/>
-            <pc:sldMk cId="1372123449" sldId="260"/>
-            <ac:spMk id="15" creationId="{364938BE-1818-651E-369A-E6DB3F9D140F}"/>
-          </ac:spMkLst>
-        </pc:spChg>
-        <pc:spChg chg="add mod">
-          <ac:chgData name="Weifeng Xu" userId="e7aed605-a3dd-4d5a-a692-a87037af107b" providerId="ADAL" clId="{825966BF-7E70-4B40-8404-AC60AE88AAC3}" dt="2025-04-30T15:37:40.112" v="624" actId="6549"/>
-          <ac:spMkLst>
-            <pc:docMk/>
-            <pc:sldMk cId="1372123449" sldId="260"/>
-            <ac:spMk id="16" creationId="{3A75D7C6-CB51-5B91-5762-C53C73CDFA88}"/>
-          </ac:spMkLst>
-        </pc:spChg>
-        <pc:spChg chg="add del mod">
-          <ac:chgData name="Weifeng Xu" userId="e7aed605-a3dd-4d5a-a692-a87037af107b" providerId="ADAL" clId="{825966BF-7E70-4B40-8404-AC60AE88AAC3}" dt="2025-06-02T14:58:04.624" v="876" actId="6549"/>
-          <ac:spMkLst>
-            <pc:docMk/>
-            <pc:sldMk cId="1372123449" sldId="260"/>
-            <ac:spMk id="18" creationId="{2A46A469-EAF5-F916-4CD0-DCA1E423CE20}"/>
-          </ac:spMkLst>
-        </pc:spChg>
-        <pc:spChg chg="add del mod">
-          <ac:chgData name="Weifeng Xu" userId="e7aed605-a3dd-4d5a-a692-a87037af107b" providerId="ADAL" clId="{825966BF-7E70-4B40-8404-AC60AE88AAC3}" dt="2025-06-02T14:58:02.294" v="871" actId="6549"/>
-          <ac:spMkLst>
-            <pc:docMk/>
-            <pc:sldMk cId="1372123449" sldId="260"/>
-            <ac:spMk id="19" creationId="{1F7168D3-A07D-9F2A-56C7-A9ED302A7426}"/>
-          </ac:spMkLst>
-        </pc:spChg>
-        <pc:spChg chg="add del mod">
-          <ac:chgData name="Weifeng Xu" userId="e7aed605-a3dd-4d5a-a692-a87037af107b" providerId="ADAL" clId="{825966BF-7E70-4B40-8404-AC60AE88AAC3}" dt="2025-06-02T14:58:03.756" v="874" actId="6549"/>
-          <ac:spMkLst>
-            <pc:docMk/>
-            <pc:sldMk cId="1372123449" sldId="260"/>
-            <ac:spMk id="20" creationId="{4D1F7162-7974-66CD-7DA8-BEE3F6638524}"/>
-          </ac:spMkLst>
-        </pc:spChg>
-        <pc:spChg chg="add del mod">
-          <ac:chgData name="Weifeng Xu" userId="e7aed605-a3dd-4d5a-a692-a87037af107b" providerId="ADAL" clId="{825966BF-7E70-4B40-8404-AC60AE88AAC3}" dt="2025-06-02T14:58:01.360" v="868" actId="6549"/>
-          <ac:spMkLst>
-            <pc:docMk/>
-            <pc:sldMk cId="1372123449" sldId="260"/>
-            <ac:spMk id="22" creationId="{15396C64-DA93-7801-8FF0-784581E1217C}"/>
-          </ac:spMkLst>
-        </pc:spChg>
-        <pc:spChg chg="add mod">
-          <ac:chgData name="Weifeng Xu" userId="e7aed605-a3dd-4d5a-a692-a87037af107b" providerId="ADAL" clId="{825966BF-7E70-4B40-8404-AC60AE88AAC3}" dt="2025-04-30T15:37:56.385" v="625"/>
-          <ac:spMkLst>
-            <pc:docMk/>
-            <pc:sldMk cId="1372123449" sldId="260"/>
-            <ac:spMk id="23" creationId="{CC4F2B91-36EB-6DD1-4DB1-A0534EF03D7D}"/>
-          </ac:spMkLst>
-        </pc:spChg>
-        <pc:spChg chg="add">
-          <ac:chgData name="Weifeng Xu" userId="e7aed605-a3dd-4d5a-a692-a87037af107b" providerId="ADAL" clId="{825966BF-7E70-4B40-8404-AC60AE88AAC3}" dt="2025-04-30T15:36:41.381" v="616" actId="11529"/>
-          <ac:spMkLst>
-            <pc:docMk/>
-            <pc:sldMk cId="1372123449" sldId="260"/>
-            <ac:spMk id="24" creationId="{B2150F54-F940-9062-D407-2481EEF2A160}"/>
-          </ac:spMkLst>
-        </pc:spChg>
-        <pc:picChg chg="add mod">
-          <ac:chgData name="Weifeng Xu" userId="e7aed605-a3dd-4d5a-a692-a87037af107b" providerId="ADAL" clId="{825966BF-7E70-4B40-8404-AC60AE88AAC3}" dt="2025-04-30T15:26:23.887" v="511" actId="14100"/>
-          <ac:picMkLst>
-            <pc:docMk/>
-            <pc:sldMk cId="1372123449" sldId="260"/>
-            <ac:picMk id="8" creationId="{EF10A3F6-9705-ADBE-5AE6-FE5B4F91D8FD}"/>
-          </ac:picMkLst>
-        </pc:picChg>
-        <pc:picChg chg="add mod">
-          <ac:chgData name="Weifeng Xu" userId="e7aed605-a3dd-4d5a-a692-a87037af107b" providerId="ADAL" clId="{825966BF-7E70-4B40-8404-AC60AE88AAC3}" dt="2025-04-30T15:26:14.214" v="508" actId="1076"/>
-          <ac:picMkLst>
-            <pc:docMk/>
-            <pc:sldMk cId="1372123449" sldId="260"/>
-            <ac:picMk id="10" creationId="{78376BC8-5FEF-7995-C2D3-C88599974FB1}"/>
-          </ac:picMkLst>
-        </pc:picChg>
       </pc:sldChg>
       <pc:sldChg chg="del">
         <pc:chgData name="Weifeng Xu" userId="e7aed605-a3dd-4d5a-a692-a87037af107b" providerId="ADAL" clId="{825966BF-7E70-4B40-8404-AC60AE88AAC3}" dt="2025-04-30T13:48:20.993" v="27" actId="47"/>
@@ -519,30 +372,6 @@
           <pc:docMk/>
           <pc:sldMk cId="707994329" sldId="261"/>
         </pc:sldMkLst>
-        <pc:spChg chg="mod">
-          <ac:chgData name="Weifeng Xu" userId="e7aed605-a3dd-4d5a-a692-a87037af107b" providerId="ADAL" clId="{825966BF-7E70-4B40-8404-AC60AE88AAC3}" dt="2025-05-02T00:08:03.707" v="706" actId="20577"/>
-          <ac:spMkLst>
-            <pc:docMk/>
-            <pc:sldMk cId="707994329" sldId="261"/>
-            <ac:spMk id="2" creationId="{B8F674A8-765F-90CA-2858-0DE55663D973}"/>
-          </ac:spMkLst>
-        </pc:spChg>
-        <pc:spChg chg="add mod">
-          <ac:chgData name="Weifeng Xu" userId="e7aed605-a3dd-4d5a-a692-a87037af107b" providerId="ADAL" clId="{825966BF-7E70-4B40-8404-AC60AE88AAC3}" dt="2025-05-02T00:09:46.281" v="757" actId="6549"/>
-          <ac:spMkLst>
-            <pc:docMk/>
-            <pc:sldMk cId="707994329" sldId="261"/>
-            <ac:spMk id="7" creationId="{E68D58EC-F0BF-0902-663D-030A2A9E77D4}"/>
-          </ac:spMkLst>
-        </pc:spChg>
-        <pc:picChg chg="add mod">
-          <ac:chgData name="Weifeng Xu" userId="e7aed605-a3dd-4d5a-a692-a87037af107b" providerId="ADAL" clId="{825966BF-7E70-4B40-8404-AC60AE88AAC3}" dt="2025-05-02T00:08:38.340" v="712" actId="14100"/>
-          <ac:picMkLst>
-            <pc:docMk/>
-            <pc:sldMk cId="707994329" sldId="261"/>
-            <ac:picMk id="6" creationId="{E10E36BA-B00B-F111-FEE4-B5717C5731DC}"/>
-          </ac:picMkLst>
-        </pc:picChg>
       </pc:sldChg>
       <pc:sldChg chg="del">
         <pc:chgData name="Weifeng Xu" userId="e7aed605-a3dd-4d5a-a692-a87037af107b" providerId="ADAL" clId="{825966BF-7E70-4B40-8404-AC60AE88AAC3}" dt="2025-04-30T13:48:20.691" v="25" actId="47"/>
@@ -557,78 +386,6 @@
           <pc:docMk/>
           <pc:sldMk cId="735738061" sldId="262"/>
         </pc:sldMkLst>
-        <pc:spChg chg="mod">
-          <ac:chgData name="Weifeng Xu" userId="e7aed605-a3dd-4d5a-a692-a87037af107b" providerId="ADAL" clId="{825966BF-7E70-4B40-8404-AC60AE88AAC3}" dt="2025-06-02T15:01:55.840" v="888" actId="313"/>
-          <ac:spMkLst>
-            <pc:docMk/>
-            <pc:sldMk cId="735738061" sldId="262"/>
-            <ac:spMk id="2" creationId="{D6FDB547-8A6B-356C-ABCF-0BBECC6122D4}"/>
-          </ac:spMkLst>
-        </pc:spChg>
-        <pc:spChg chg="add mod">
-          <ac:chgData name="Weifeng Xu" userId="e7aed605-a3dd-4d5a-a692-a87037af107b" providerId="ADAL" clId="{825966BF-7E70-4B40-8404-AC60AE88AAC3}" dt="2025-06-02T15:18:11.834" v="938" actId="1076"/>
-          <ac:spMkLst>
-            <pc:docMk/>
-            <pc:sldMk cId="735738061" sldId="262"/>
-            <ac:spMk id="7" creationId="{7489CD09-C7D9-8C00-4A75-A893E50D9F7A}"/>
-          </ac:spMkLst>
-        </pc:spChg>
-        <pc:spChg chg="add del">
-          <ac:chgData name="Weifeng Xu" userId="e7aed605-a3dd-4d5a-a692-a87037af107b" providerId="ADAL" clId="{825966BF-7E70-4B40-8404-AC60AE88AAC3}" dt="2025-06-02T15:18:31.798" v="940" actId="478"/>
-          <ac:spMkLst>
-            <pc:docMk/>
-            <pc:sldMk cId="735738061" sldId="262"/>
-            <ac:spMk id="8" creationId="{13FD0233-278E-79E2-917C-1DC7D0FA3443}"/>
-          </ac:spMkLst>
-        </pc:spChg>
-        <pc:spChg chg="add mod">
-          <ac:chgData name="Weifeng Xu" userId="e7aed605-a3dd-4d5a-a692-a87037af107b" providerId="ADAL" clId="{825966BF-7E70-4B40-8404-AC60AE88AAC3}" dt="2025-06-02T15:19:14.412" v="944" actId="692"/>
-          <ac:spMkLst>
-            <pc:docMk/>
-            <pc:sldMk cId="735738061" sldId="262"/>
-            <ac:spMk id="9" creationId="{C0562CB6-173F-C0FB-2371-22622B37ED7F}"/>
-          </ac:spMkLst>
-        </pc:spChg>
-        <pc:spChg chg="add mod">
-          <ac:chgData name="Weifeng Xu" userId="e7aed605-a3dd-4d5a-a692-a87037af107b" providerId="ADAL" clId="{825966BF-7E70-4B40-8404-AC60AE88AAC3}" dt="2025-06-02T15:21:54.471" v="988" actId="207"/>
-          <ac:spMkLst>
-            <pc:docMk/>
-            <pc:sldMk cId="735738061" sldId="262"/>
-            <ac:spMk id="10" creationId="{00CED87D-83E6-E451-3FE7-65F71470EC6C}"/>
-          </ac:spMkLst>
-        </pc:spChg>
-        <pc:graphicFrameChg chg="add mod modGraphic">
-          <ac:chgData name="Weifeng Xu" userId="e7aed605-a3dd-4d5a-a692-a87037af107b" providerId="ADAL" clId="{825966BF-7E70-4B40-8404-AC60AE88AAC3}" dt="2025-06-02T15:20:44.163" v="977" actId="1076"/>
-          <ac:graphicFrameMkLst>
-            <pc:docMk/>
-            <pc:sldMk cId="735738061" sldId="262"/>
-            <ac:graphicFrameMk id="5" creationId="{592D49FB-5C9C-1728-B5E1-E8220945C979}"/>
-          </ac:graphicFrameMkLst>
-        </pc:graphicFrameChg>
-        <pc:graphicFrameChg chg="add mod modGraphic">
-          <ac:chgData name="Weifeng Xu" userId="e7aed605-a3dd-4d5a-a692-a87037af107b" providerId="ADAL" clId="{825966BF-7E70-4B40-8404-AC60AE88AAC3}" dt="2025-06-02T15:18:11.834" v="938" actId="1076"/>
-          <ac:graphicFrameMkLst>
-            <pc:docMk/>
-            <pc:sldMk cId="735738061" sldId="262"/>
-            <ac:graphicFrameMk id="6" creationId="{83DE73EC-240E-F621-3906-B60E56A4EF12}"/>
-          </ac:graphicFrameMkLst>
-        </pc:graphicFrameChg>
-        <pc:picChg chg="add mod">
-          <ac:chgData name="Weifeng Xu" userId="e7aed605-a3dd-4d5a-a692-a87037af107b" providerId="ADAL" clId="{825966BF-7E70-4B40-8404-AC60AE88AAC3}" dt="2025-06-02T15:17:20.811" v="930" actId="1076"/>
-          <ac:picMkLst>
-            <pc:docMk/>
-            <pc:sldMk cId="735738061" sldId="262"/>
-            <ac:picMk id="3" creationId="{B49ACBC5-CA7A-9397-20F6-638B17D5603F}"/>
-          </ac:picMkLst>
-        </pc:picChg>
-        <pc:picChg chg="add mod">
-          <ac:chgData name="Weifeng Xu" userId="e7aed605-a3dd-4d5a-a692-a87037af107b" providerId="ADAL" clId="{825966BF-7E70-4B40-8404-AC60AE88AAC3}" dt="2025-06-02T15:18:11.834" v="938" actId="1076"/>
-          <ac:picMkLst>
-            <pc:docMk/>
-            <pc:sldMk cId="735738061" sldId="262"/>
-            <ac:picMk id="4" creationId="{B6393EC2-2AD7-E898-19DA-AF892CEEEEF4}"/>
-          </ac:picMkLst>
-        </pc:picChg>
       </pc:sldChg>
       <pc:sldChg chg="del">
         <pc:chgData name="Weifeng Xu" userId="e7aed605-a3dd-4d5a-a692-a87037af107b" providerId="ADAL" clId="{825966BF-7E70-4B40-8404-AC60AE88AAC3}" dt="2025-04-30T13:48:20.847" v="26" actId="47"/>
@@ -652,22 +409,6 @@
           <pc:docMk/>
           <pc:sldMk cId="1325061211" sldId="256"/>
         </pc:sldMkLst>
-        <pc:spChg chg="mod ord">
-          <ac:chgData name="Weifeng Xu" userId="e7aed605-a3dd-4d5a-a692-a87037af107b" providerId="ADAL" clId="{8E5A6AEC-921D-4BE6-8002-CC8D4F2830D2}" dt="2025-04-27T15:24:07.342" v="34" actId="700"/>
-          <ac:spMkLst>
-            <pc:docMk/>
-            <pc:sldMk cId="1325061211" sldId="256"/>
-            <ac:spMk id="2" creationId="{00000000-0000-0000-0000-000000000000}"/>
-          </ac:spMkLst>
-        </pc:spChg>
-        <pc:spChg chg="mod ord">
-          <ac:chgData name="Weifeng Xu" userId="e7aed605-a3dd-4d5a-a692-a87037af107b" providerId="ADAL" clId="{8E5A6AEC-921D-4BE6-8002-CC8D4F2830D2}" dt="2025-04-27T15:24:07.342" v="34" actId="700"/>
-          <ac:spMkLst>
-            <pc:docMk/>
-            <pc:sldMk cId="1325061211" sldId="256"/>
-            <ac:spMk id="3" creationId="{00000000-0000-0000-0000-000000000000}"/>
-          </ac:spMkLst>
-        </pc:spChg>
       </pc:sldChg>
       <pc:sldChg chg="del">
         <pc:chgData name="Weifeng Xu" userId="e7aed605-a3dd-4d5a-a692-a87037af107b" providerId="ADAL" clId="{8E5A6AEC-921D-4BE6-8002-CC8D4F2830D2}" dt="2025-04-27T15:25:06.899" v="35" actId="47"/>
@@ -847,14 +588,6 @@
           <pc:docMk/>
           <pc:sldMk cId="1325061211" sldId="256"/>
         </pc:sldMkLst>
-        <pc:spChg chg="mod">
-          <ac:chgData name="Weifeng Xu" userId="e7aed605-a3dd-4d5a-a692-a87037af107b" providerId="ADAL" clId="{9C06CBEB-0343-4287-8B81-0C702673DE5E}" dt="2025-04-23T01:31:59.756" v="4545" actId="20577"/>
-          <ac:spMkLst>
-            <pc:docMk/>
-            <pc:sldMk cId="1325061211" sldId="256"/>
-            <ac:spMk id="2" creationId="{00000000-0000-0000-0000-000000000000}"/>
-          </ac:spMkLst>
-        </pc:spChg>
       </pc:sldChg>
       <pc:sldChg chg="addSp delSp modSp mod modClrScheme chgLayout">
         <pc:chgData name="Weifeng Xu" userId="e7aed605-a3dd-4d5a-a692-a87037af107b" providerId="ADAL" clId="{9C06CBEB-0343-4287-8B81-0C702673DE5E}" dt="2025-04-20T02:53:00.098" v="242" actId="20577"/>
@@ -997,15 +730,6 @@
             <pc:sldMasterMk cId="813574162" sldId="2147483648"/>
             <pc:sldLayoutMk cId="821171414" sldId="2147483649"/>
           </pc:sldLayoutMkLst>
-          <pc:spChg chg="add del mod">
-            <ac:chgData name="Weifeng Xu" userId="e7aed605-a3dd-4d5a-a692-a87037af107b" providerId="ADAL" clId="{E34D94EB-D766-41A9-93D0-B8D12317CF67}" dt="2025-04-19T02:11:54.327" v="3" actId="1076"/>
-            <ac:spMkLst>
-              <pc:docMk/>
-              <pc:sldMasterMk cId="813574162" sldId="2147483648"/>
-              <pc:sldLayoutMk cId="821171414" sldId="2147483649"/>
-              <ac:spMk id="4" creationId="{00000000-0000-0000-0000-000000000000}"/>
-            </ac:spMkLst>
-          </pc:spChg>
         </pc:sldLayoutChg>
         <pc:sldLayoutChg chg="setBg">
           <pc:chgData name="Weifeng Xu" userId="e7aed605-a3dd-4d5a-a692-a87037af107b" providerId="ADAL" clId="{E34D94EB-D766-41A9-93D0-B8D12317CF67}" dt="2025-04-19T02:39:28.427" v="133"/>
@@ -1216,7 +940,35 @@
 </inkml:ink>
 </file>
 
-<file path=ppt/ink/ink2.xml><?xml version="1.0" encoding="utf-8"?>
+<file path=ppt/ink/ink10.xml><?xml version="1.0" encoding="utf-8"?>
+<inkml:ink xmlns:inkml="http://www.w3.org/2003/InkML">
+  <inkml:definitions>
+    <inkml:context xml:id="ctx0">
+      <inkml:inkSource xml:id="inkSrc0">
+        <inkml:traceFormat>
+          <inkml:channel name="X" type="integer" min="-2.14748E9" max="2.14748E9" units="cm"/>
+          <inkml:channel name="Y" type="integer" min="-2.14748E9" max="2.14748E9" units="cm"/>
+          <inkml:channel name="F" type="integer" max="32767" units="dev"/>
+        </inkml:traceFormat>
+        <inkml:channelProperties>
+          <inkml:channelProperty channel="X" name="resolution" value="1000" units="1/cm"/>
+          <inkml:channelProperty channel="Y" name="resolution" value="1000" units="1/cm"/>
+          <inkml:channelProperty channel="F" name="resolution" value="0" units="1/dev"/>
+        </inkml:channelProperties>
+      </inkml:inkSource>
+      <inkml:timestamp xml:id="ts0" timeString="2025-10-02T13:04:19.818"/>
+    </inkml:context>
+    <inkml:brush xml:id="br0">
+      <inkml:brushProperty name="width" value="0.1" units="cm"/>
+      <inkml:brushProperty name="height" value="0.1" units="cm"/>
+      <inkml:brushProperty name="color" value="#FF0066"/>
+    </inkml:brush>
+  </inkml:definitions>
+  <inkml:trace contextRef="#ctx0" brushRef="#br0">1 10 24575,'0'0'0,"0"0"0,0-1 0,0 1 0,0 0 0,0-1 0,0 1 0,0-1 0,0 1 0,0 0 0,0-1 0,0 1 0,1 0 0,-1-1 0,0 1 0,0 0 0,0-1 0,1 1 0,-1 0 0,0 0 0,0-1 0,0 1 0,1 0 0,-1-1 0,0 1 0,1 0 0,-1 0 0,0 0 0,1-1 0,-1 1 0,0 0 0,1 0 0,-1 0 0,0 0 0,1 0 0,15 3 0,12 13 0,-20-9 0,0 0 0,0 0 0,0 0 0,11 4 0,-16-8 0,1-1 0,1 0 0,-1 0 0,0-1 0,0 1 0,1-1 0,-1 0 0,1 0 0,-1-1 0,1 1 0,8-1 0,-13 0 0,0 0 0,1 0 0,-1 0 0,0 0 0,1 0 0,-1 0 0,0 0 0,1 0 0,-1-1 0,0 1 0,1 0 0,-1 0 0,0 0 0,0 0 0,1-1 0,-1 1 0,0 0 0,1 0 0,-1-1 0,0 1 0,0 0 0,0 0 0,1-1 0,-1 1 0,0 0 0,0-1 0,0 1 0,0 0 0,0-1 0,1 1 0,-1 0 0,0-1 0,0 1 0,0 0 0,0-1 0,0 1 0,0 0 0,0-1 0,0 1 0,0 0 0,0-1 0,-1 1 0,1 0 0,0-1 0,0 1 0,0 0 0,0-1 0,0 1 0,-1 0 0,1-1 0,0 1 0,0 0 0,0 0 0,-1-1 0,0 0 0,1 1 0,-1-1 0,1 0 0,-1 1 0,1-1 0,-1 1 0,0-1 0,1 1 0,-1-1 0,0 1 0,1-1 0,-1 1 0,0 0 0,0-1 0,1 1 0,-1 0 0,0 0 0,0 0 0,0 0 0,0-1 0,1 1 0,-1 0 0,0 0 0,0 0 0,0 1 0,0-1 0,1 0 0,-2 0 0,-1 2 0,1-1 0,0 1 0,-1-1 0,1 1 0,0 0 0,0-1 0,0 1 0,0 0 0,0 0 0,1 1 0,-1-1 0,1 0 0,-1 1 0,1-1 0,0 1 0,0-1 0,0 1 0,0-1 0,1 1 0,-1 0 0,0 3 0,1-3 0,-1 0 0,1-1 0,-1 1 0,0-1 0,1 1 0,-1-1 0,0 1 0,-1-1 0,1 0 0,0 1 0,-1-1 0,1 0 0,-1 0 0,0 0 0,0 0 0,1 0 0,-1 0 0,0-1 0,-1 1 0,-2 1 0,3-3 0,0 0 0,0 0 0,0 0 0,0 0 0,0 0 0,0 0 0,0-1 0,0 1 0,0-1 0,0 1 0,0-1 0,0 0 0,0 0 0,0 0 0,0 0 0,1 0 0,-3-2 0,2 2 0,-1-1 0,1 1 0,0-1 0,0 0 0,0 1 0,0-1 0,0 0 0,1-1 0,-1 1 0,0 0 0,1 0 0,-2-5 0,3 7-34,0-1 0,0 0 0,1 0 0,-1 0 0,1 0 0,-1 0 0,1 1 1,-1-1-1,1 0 0,-1 0 0,1 1 0,-1-1 0,1 0 0,0 1 0,0-1 0,-1 1 0,1-1 0,0 1 0,0-1 0,0 1 0,-1-1 0,1 1 0,0 0 0,0 0 0,0-1 0,0 1 0,0 0 0,0 0 0,0 0 0,0 0 0,-1 0 0,2 0 0,-1 0-210</inkml:trace>
+</inkml:ink>
+</file>
+
+<file path=ppt/ink/ink11.xml><?xml version="1.0" encoding="utf-8"?>
 <inkml:ink xmlns:inkml="http://www.w3.org/2003/InkML">
   <inkml:definitions>
     <inkml:context xml:id="ctx0">
@@ -1244,7 +996,7 @@
 </inkml:ink>
 </file>
 
-<file path=ppt/ink/ink3.xml><?xml version="1.0" encoding="utf-8"?>
+<file path=ppt/ink/ink12.xml><?xml version="1.0" encoding="utf-8"?>
 <inkml:ink xmlns:inkml="http://www.w3.org/2003/InkML">
   <inkml:definitions>
     <inkml:context xml:id="ctx0">
@@ -1272,7 +1024,7 @@
 </inkml:ink>
 </file>
 
-<file path=ppt/ink/ink4.xml><?xml version="1.0" encoding="utf-8"?>
+<file path=ppt/ink/ink13.xml><?xml version="1.0" encoding="utf-8"?>
 <inkml:ink xmlns:inkml="http://www.w3.org/2003/InkML">
   <inkml:definitions>
     <inkml:context xml:id="ctx0">
@@ -1300,7 +1052,7 @@
 </inkml:ink>
 </file>
 
-<file path=ppt/ink/ink5.xml><?xml version="1.0" encoding="utf-8"?>
+<file path=ppt/ink/ink14.xml><?xml version="1.0" encoding="utf-8"?>
 <inkml:ink xmlns:inkml="http://www.w3.org/2003/InkML">
   <inkml:definitions>
     <inkml:context xml:id="ctx0">
@@ -1328,7 +1080,7 @@
 </inkml:ink>
 </file>
 
-<file path=ppt/ink/ink6.xml><?xml version="1.0" encoding="utf-8"?>
+<file path=ppt/ink/ink15.xml><?xml version="1.0" encoding="utf-8"?>
 <inkml:ink xmlns:inkml="http://www.w3.org/2003/InkML">
   <inkml:definitions>
     <inkml:context xml:id="ctx0">
@@ -1356,6 +1108,230 @@
 </inkml:ink>
 </file>
 
+<file path=ppt/ink/ink2.xml><?xml version="1.0" encoding="utf-8"?>
+<inkml:ink xmlns:inkml="http://www.w3.org/2003/InkML">
+  <inkml:definitions>
+    <inkml:context xml:id="ctx0">
+      <inkml:inkSource xml:id="inkSrc0">
+        <inkml:traceFormat>
+          <inkml:channel name="X" type="integer" min="-2.14748E9" max="2.14748E9" units="cm"/>
+          <inkml:channel name="Y" type="integer" min="-2.14748E9" max="2.14748E9" units="cm"/>
+          <inkml:channel name="F" type="integer" max="32767" units="dev"/>
+        </inkml:traceFormat>
+        <inkml:channelProperties>
+          <inkml:channelProperty channel="X" name="resolution" value="1000" units="1/cm"/>
+          <inkml:channelProperty channel="Y" name="resolution" value="1000" units="1/cm"/>
+          <inkml:channelProperty channel="F" name="resolution" value="0" units="1/dev"/>
+        </inkml:channelProperties>
+      </inkml:inkSource>
+      <inkml:timestamp xml:id="ts0" timeString="2025-10-02T13:01:30.762"/>
+    </inkml:context>
+    <inkml:brush xml:id="br0">
+      <inkml:brushProperty name="width" value="0.1" units="cm"/>
+      <inkml:brushProperty name="height" value="0.1" units="cm"/>
+      <inkml:brushProperty name="color" value="#FF0066"/>
+    </inkml:brush>
+  </inkml:definitions>
+  <inkml:trace contextRef="#ctx0" brushRef="#br0">990 39 24575,'-494'0'0,"475"2"0,0 0 0,1 1 0,-1 1 0,-35 13 0,-8 1 0,55-17 0,0 1 0,0-1 0,0 1 0,0 1 0,0-1 0,1 1 0,-1 0 0,1 1 0,0-1 0,-1 1 0,2 1 0,-1-1 0,-7 8 0,-15 16 0,20-21 0,1 0 0,0 0 0,0 0 0,1 1 0,-1 0 0,-8 18 0,8-13 0,-1 1 0,-1-1 0,0-1 0,-12 14 0,14-19 0,1 0 0,0 1 0,0-1 0,1 1 0,0 0 0,0 1 0,1-1 0,0 1 0,0 0 0,1 0 0,0 0 0,1 1 0,-2 9 0,2 10 0,0 1 0,3-1 0,5 48 0,-5-65 0,2-1 0,-1 0 0,2 0 0,-1 0 0,1-1 0,1 1 0,0-1 0,1 0 0,-1 0 0,2-1 0,0 1 0,10 10 0,-9-10 0,0-1 0,13 22 0,-16-23 0,0 0 0,0-1 0,1 1 0,0-1 0,0 0 0,1-1 0,9 8 0,44 38 0,-3-3 0,-51-44 0,1 0 0,0 0 0,0 0 0,0-1 0,1 0 0,-1-1 0,1 0 0,0 0 0,0-1 0,17 3 0,-17-3 0,1 1 0,-1 0 0,1 0 0,-1 0 0,0 1 0,12 7 0,27 12 0,-8-7 0,-28-11 0,-1-1 0,1 0 0,0-1 0,0 0 0,0 0 0,18 1 0,2-3 0,3 0 0,50 8 0,144 18 0,-155-18 0,-36-5 0,41 1 0,302-5 0,-338-3-1421,0-1 0,79-19 0,38-4-1485,-140 25 3449,0-1 0,-1-1 0,1 0 0,-1-2 0,25-10 0,80-49 3292,-107 56-3759,19-9-76,-27 15 0,0-1 0,-1 0 0,1 0 0,-1-1 0,0 0 0,0 0 0,0-1 0,-1 0 0,0 0 0,0 0 0,0-1 0,4-7 0,-2 3 0,-1 0 0,2 1 0,12-13 0,-15 18 0,-1 0 0,0 0 0,0-1 0,0 0 0,-1 0 0,0 0 0,0 0 0,0-1 0,-1 1 0,0-1 0,0 0 0,-1 0 0,0 0 0,2-10 0,5-38 0,-6 41 0,0 1 0,-1-1 0,0 0 0,-1 0 0,-1 0 0,-1 0 0,-2-21 0,-1 24 0,0 0 0,-1 0 0,-1 0 0,0 1 0,-9-13 0,-12-23 0,20 35 0,0 0 0,0 1 0,-1 0 0,0 0 0,-1 1 0,0 0 0,-11-8 0,-21-21 0,12 16 0,-270-123-379,88 57-5276,180 76 5344,0 2 1,-46-9 0,56 15 1703,-1 1 0,0 1 0,1 1 0,-33 3 0,45 0-1469,-1 0 0,1 0 0,0 1 0,0 1 0,0 0 0,1 0-1,-1 0 1,1 1 0,0 1 0,-12 9 0,13-10-452,-15 10-6298</inkml:trace>
+</inkml:ink>
+</file>
+
+<file path=ppt/ink/ink3.xml><?xml version="1.0" encoding="utf-8"?>
+<inkml:ink xmlns:inkml="http://www.w3.org/2003/InkML">
+  <inkml:definitions>
+    <inkml:context xml:id="ctx0">
+      <inkml:inkSource xml:id="inkSrc0">
+        <inkml:traceFormat>
+          <inkml:channel name="X" type="integer" min="-2.14748E9" max="2.14748E9" units="cm"/>
+          <inkml:channel name="Y" type="integer" min="-2.14748E9" max="2.14748E9" units="cm"/>
+          <inkml:channel name="F" type="integer" max="32767" units="dev"/>
+        </inkml:traceFormat>
+        <inkml:channelProperties>
+          <inkml:channelProperty channel="X" name="resolution" value="1000" units="1/cm"/>
+          <inkml:channelProperty channel="Y" name="resolution" value="1000" units="1/cm"/>
+          <inkml:channelProperty channel="F" name="resolution" value="0" units="1/dev"/>
+        </inkml:channelProperties>
+      </inkml:inkSource>
+      <inkml:timestamp xml:id="ts0" timeString="2025-10-02T13:01:35.696"/>
+    </inkml:context>
+    <inkml:brush xml:id="br0">
+      <inkml:brushProperty name="width" value="0.1" units="cm"/>
+      <inkml:brushProperty name="height" value="0.1" units="cm"/>
+      <inkml:brushProperty name="color" value="#FF0066"/>
+    </inkml:brush>
+  </inkml:definitions>
+  <inkml:trace contextRef="#ctx0" brushRef="#br0">817 95 24575,'-12'0'0,"-1"2"0,1 0 0,0 0 0,0 1 0,0 1 0,0 0 0,0 0 0,1 1 0,-18 11 0,-14 6 0,28-14 0,0-1 0,1 2 0,-20 14 0,-102 79-562,80-63 130,-66 60-1,50-26 1622,55-59-1165,2 1 0,0 0 0,0 2 0,2-1-1,0 2 1,1-1 0,1 2 0,0 0-1,-12 31 1,17-35-24,1 0 0,0 0 0,1 0 0,-3 30 0,6-38 0,1 0 0,0 1 0,1-1 0,0 1 0,0-1 0,0 0 0,1 0 0,0 0 0,0 0 0,1 0 0,0 0 0,5 9 0,0-1 0,-1 0 0,-1 1 0,0 0 0,4 19 0,14 36 0,-18-48 0,-6-19 0,1 0 0,0 0 0,0 0 0,0 0 0,0-1 0,1 1 0,0 0 0,0-1 0,3 6 0,30 40-355,61 63 0,4-10-3296,-77-81 2627,36 26 1,-48-40 1794,0 0 1,1 0 0,14 5-1,16 1 2193,-35-12-2924,0 1-1,1 0 1,-1 1 0,0-1 0,-1 1 0,1 1 0,0-1-1,7 6 1,-6-3-40,1-1 0,0 0 0,1 0 0,-1-1 0,12 4 0,-11-5 0,0 1 0,-1 0 0,1 1 0,16 11 0,-21-13 0,1 0 0,-1 0 0,0-1 0,1 1 0,0-1 0,-1 0 0,13 1 0,-12-2 0,0 1 0,-1-1 0,1 1 0,0 0 0,-1 0 0,1 1 0,-1 0 0,8 5 0,82 53 0,-89-56 0,0-2 0,0 1 0,1-1 0,-1 0 0,1 0 0,0-1 0,-1 0 0,10 2 0,-7-2 0,-1 0 0,0 1 0,0 0 0,0 0 0,8 5 0,2 1 0,0-1 0,0-1 0,1 0 0,0-1 0,0-1 0,27 3 0,5 2 0,-18-4 0,0-1 0,1-3 0,0 0 0,0-2 0,35-5 0,-59 4 0,0-1 0,-1 0 0,1-1 0,0 0 0,-1 0 0,0-1 0,13-8 0,59-42 0,-13 8 0,-61 41 0,0 0 0,0 0 0,0-1 0,-1 0 0,0 0 0,0 0 0,8-13 0,-2 3 0,27-26 0,326-296-4789,-320 304 5234,-38 30-234,0 0 1,0-1-1,-1 0 1,0 0-1,0 0 1,-1-1-1,1 0 1,-1 0-1,0 0 0,-1-1 1,4-7-1,1-7 35,-1 0 0,-2 0-1,0 0 1,-1-1 0,-1 0-1,-1 0 1,0-30 0,-3 3-299,-2 0 0,-11-64 0,5 62 53,-3 1 0,-1 0 0,-3 0 0,-2 1 0,-23-46 0,36 86 0,0-1 0,1 0 0,0 0 0,0 0 0,1-1 0,-1-17 0,3 28 0,-1-4 0,-1-1 0,1 1 0,-1 0 0,0 0 0,-1 1 0,1-1 0,-1 0 0,1 1 0,-1-1 0,0 1 0,-6-5 0,-11-15 0,15 16 0,0 0 0,0 1 0,-1 0 0,1 0 0,-1 0 0,-1 1 0,1 0 0,-1 0 0,0 0 0,0 1 0,-13-6 0,9 5 0,1-1 0,0-1 0,-9-7 0,10 7 0,0 0 0,-1 1 0,-17-10 0,24 15 0,-101-48 0,86 41 0,0 2 0,-1 0 0,0 1 0,0 1 0,0 0 0,-26 0 0,27 2 0,-127-13-1365,110 12-5461</inkml:trace>
+</inkml:ink>
+</file>
+
+<file path=ppt/ink/ink4.xml><?xml version="1.0" encoding="utf-8"?>
+<inkml:ink xmlns:inkml="http://www.w3.org/2003/InkML">
+  <inkml:definitions>
+    <inkml:context xml:id="ctx0">
+      <inkml:inkSource xml:id="inkSrc0">
+        <inkml:traceFormat>
+          <inkml:channel name="X" type="integer" min="-2.14748E9" max="2.14748E9" units="cm"/>
+          <inkml:channel name="Y" type="integer" min="-2.14748E9" max="2.14748E9" units="cm"/>
+          <inkml:channel name="F" type="integer" max="32767" units="dev"/>
+        </inkml:traceFormat>
+        <inkml:channelProperties>
+          <inkml:channelProperty channel="X" name="resolution" value="1000" units="1/cm"/>
+          <inkml:channelProperty channel="Y" name="resolution" value="1000" units="1/cm"/>
+          <inkml:channelProperty channel="F" name="resolution" value="0" units="1/dev"/>
+        </inkml:channelProperties>
+      </inkml:inkSource>
+      <inkml:timestamp xml:id="ts0" timeString="2025-10-02T13:01:40.658"/>
+    </inkml:context>
+    <inkml:brush xml:id="br0">
+      <inkml:brushProperty name="width" value="0.1" units="cm"/>
+      <inkml:brushProperty name="height" value="0.1" units="cm"/>
+      <inkml:brushProperty name="color" value="#FF0066"/>
+    </inkml:brush>
+  </inkml:definitions>
+  <inkml:trace contextRef="#ctx0" brushRef="#br0">1 814 24575,'20'-17'0,"0"1"0,1 2 0,30-17 0,-27 18 0,-1-2 0,35-29 0,-49 36 0,63-51 0,-68 55 0,0-1 0,0 1 0,0-1 0,0 0 0,0 0 0,-1 0 0,0 0 0,4-11 0,14-19 0,-5 14 0,22-37 0,-34 50 0,0 0 0,0-1 0,0 1 0,-2-1 0,1 0 0,-1 0 0,0 0 0,1-11 0,5-48 0,-4 44 0,1-36 0,-4 20 0,-3-72 0,2 111 0,0 0 0,0-1 0,0 1 0,0 0 0,0-1 0,0 1 0,0 0 0,0-1 0,-1 1 0,1 0 0,-1-1 0,1 1 0,-1 0 0,1 0 0,-1 0 0,0-1 0,1 1 0,-1 0 0,0 0 0,0 0 0,0 0 0,0 0 0,0 1 0,0-1 0,0 0 0,0 0 0,0 1 0,-1-1 0,1 0 0,0 1 0,0-1 0,-1 1 0,1 0 0,0-1 0,-1 1 0,1 0 0,0 0 0,-1 0 0,1 0 0,0 0 0,-1 0 0,1 0 0,0 0 0,-1 1 0,1-1 0,0 0 0,0 1 0,-1-1 0,1 1 0,0 0 0,0-1 0,0 1 0,-2 1 0,-2 1 0,0 0 0,0 0 0,0 0 0,1 1 0,0 0 0,-1 0 0,1 0 0,1 0 0,-1 1 0,0-1 0,-4 10 0,3-4-227,0 1-1,0-1 1,-1-1-1,0 1 1,-11 11-1</inkml:trace>
+</inkml:ink>
+</file>
+
+<file path=ppt/ink/ink5.xml><?xml version="1.0" encoding="utf-8"?>
+<inkml:ink xmlns:inkml="http://www.w3.org/2003/InkML">
+  <inkml:definitions>
+    <inkml:context xml:id="ctx0">
+      <inkml:inkSource xml:id="inkSrc0">
+        <inkml:traceFormat>
+          <inkml:channel name="X" type="integer" min="-2.14748E9" max="2.14748E9" units="cm"/>
+          <inkml:channel name="Y" type="integer" min="-2.14748E9" max="2.14748E9" units="cm"/>
+          <inkml:channel name="F" type="integer" max="32767" units="dev"/>
+        </inkml:traceFormat>
+        <inkml:channelProperties>
+          <inkml:channelProperty channel="X" name="resolution" value="1000" units="1/cm"/>
+          <inkml:channelProperty channel="Y" name="resolution" value="1000" units="1/cm"/>
+          <inkml:channelProperty channel="F" name="resolution" value="0" units="1/dev"/>
+        </inkml:channelProperties>
+      </inkml:inkSource>
+      <inkml:timestamp xml:id="ts0" timeString="2025-10-02T13:01:41.486"/>
+    </inkml:context>
+    <inkml:brush xml:id="br0">
+      <inkml:brushProperty name="width" value="0.1" units="cm"/>
+      <inkml:brushProperty name="height" value="0.1" units="cm"/>
+      <inkml:brushProperty name="color" value="#FF0066"/>
+    </inkml:brush>
+  </inkml:definitions>
+  <inkml:trace contextRef="#ctx0" brushRef="#br0">1 20 24575,'0'-3'-3276,"3"-1"3242,5 0 1616,3 0-1582,4 2 559,2 1-559,2 0 286,1 1-286,-1 0 883,-2 3-883,-2 1 0,1 1 0,0-2 0,0-1 0,-1 3 0,-1 1 0</inkml:trace>
+</inkml:ink>
+</file>
+
+<file path=ppt/ink/ink6.xml><?xml version="1.0" encoding="utf-8"?>
+<inkml:ink xmlns:inkml="http://www.w3.org/2003/InkML">
+  <inkml:definitions>
+    <inkml:context xml:id="ctx0">
+      <inkml:inkSource xml:id="inkSrc0">
+        <inkml:traceFormat>
+          <inkml:channel name="X" type="integer" min="-2.14748E9" max="2.14748E9" units="cm"/>
+          <inkml:channel name="Y" type="integer" min="-2.14748E9" max="2.14748E9" units="cm"/>
+          <inkml:channel name="F" type="integer" max="32767" units="dev"/>
+        </inkml:traceFormat>
+        <inkml:channelProperties>
+          <inkml:channelProperty channel="X" name="resolution" value="1000" units="1/cm"/>
+          <inkml:channelProperty channel="Y" name="resolution" value="1000" units="1/cm"/>
+          <inkml:channelProperty channel="F" name="resolution" value="0" units="1/dev"/>
+        </inkml:channelProperties>
+      </inkml:inkSource>
+      <inkml:timestamp xml:id="ts0" timeString="2025-10-02T13:01:44.565"/>
+    </inkml:context>
+    <inkml:brush xml:id="br0">
+      <inkml:brushProperty name="width" value="0.1" units="cm"/>
+      <inkml:brushProperty name="height" value="0.1" units="cm"/>
+      <inkml:brushProperty name="color" value="#FF0066"/>
+    </inkml:brush>
+  </inkml:definitions>
+  <inkml:trace contextRef="#ctx0" brushRef="#br0">0 7981 24575,'2'-3'-331,"0"0"0,0 0 0,0 0 0,0 0 0,0 1 0,1-1 0,-1 1 0,4-3 0,3-1 468,0 0 0,0 1 0,14-6 0,-13 7 295,1-1 0,-2 0-1,1-1 1,13-10 0,45-45-341,-2-2 0,76-97-1,-99 109-90,-28 36 0,-1-1 0,-1-1 0,0 0 0,-2-1 0,12-22 0,-16 26 0,1 0 0,1 0 0,19-23 0,-17 25 0,-2-1 0,0 1 0,-1-2 0,8-15 0,22-46 0,59-90 0,-68 118 0,109-150 0,-98 135 0,-32 47 0,1 0 0,0 1 0,1 0 0,12-13 0,-3 7 0,-2-2 0,-1 0 0,14-25 0,23-31 0,-43 62 0,0 1 0,-2-1 0,14-34 0,8-14 0,-13 32 0,2-4 0,28-38 0,-23 37 0,37-77 0,-13 20 0,-9 11 0,-6 9 0,-11 34 0,-8 17 0,-2-1 0,-1 1 0,12-35 0,-12 25 0,2 1 0,26-47 0,-23 49 0,-1-1 0,19-58 0,73-225 0,-92 270 0,13-59 0,-18 59 0,23-62 0,-16 57 0,-2 0 0,-2-1 0,-2-1 0,-3 0 0,3-91 0,43-329-1054,-46 428 1054,-3 20 0,-2 0 0,1-27 0,4-71 570,14-61-4509,2-18 740,-18 97 3374,-7-136 7354,-1 90-7611,3 80 82,-2-77 0,-3 125 0,0 0 0,-7-22 0,5 23 0,1-1 0,-2-22 0,2 7 0,-16-55 0,0-2 0,9-28 0,10 83 0,-1 1 0,-11-47 0,-15-86 0,25 140 0,-20-123 0,19 126 0,-1 1 0,-2 1 0,0-1 0,-17-34 0,-11-30 0,8 25 0,22 55 0,1-1 0,0 1 0,1-2 0,0 1 0,0 0 0,2-1 0,-1 1 0,-1-20 0,4 21 0,0 0 0,-1-1 0,0 1 0,-1 0 0,0 0 0,-1 1 0,0-1 0,-1 0 0,1 1 0,-7-10 0,-7-12 0,-4-6 0,1-1 0,-18-50 0,30 61 0,5 17 0,0 1 0,0 0 0,0 0 0,-6-9 0,-9-26 0,15 35 0,0 0 0,-1 0 0,0 0 0,-5-8 0,3 6 0,0-1 0,1-1 0,1 1 0,0-1 0,0 1 0,1-1 0,1 0 0,-1-16 0,-12-49 0,-37-60 0,47 119 0,-2 0 0,-1 0 0,0 0 0,-1 1 0,-1 0 0,-1 1 0,-13-17 0,23 33 0,1 1 0,-1-1 0,1 1 0,-1-1 0,0 1 0,1 0 0,-1-1 0,0 1 0,1 0 0,-1 0 0,0-1 0,0 1 0,1 0 0,-1 0 0,0 0 0,0 0 0,1 0 0,-1 0 0,0 0 0,0 0 0,1 0 0,-1 0 0,0 1 0,0-1 0,1 0 0,-1 0 0,0 1 0,1-1 0,-1 0 0,0 1 0,1-1 0,-1 1 0,1-1 0,-1 1 0,0-1 0,1 1 0,-1-1 0,1 1 0,0 0 0,-1-1 0,1 1 0,-1-1 0,1 1 0,-1 1 0,-22 38 0,18-30 0,-14 25 0,11-18 0,-1 0 0,-1-1 0,-21 26 0,20-27 0,1 0 0,0 1 0,1 0 0,0 1 0,2 0 0,-9 27 0,-4 6 0,-11 16-1365</inkml:trace>
+</inkml:ink>
+</file>
+
+<file path=ppt/ink/ink7.xml><?xml version="1.0" encoding="utf-8"?>
+<inkml:ink xmlns:inkml="http://www.w3.org/2003/InkML">
+  <inkml:definitions>
+    <inkml:context xml:id="ctx0">
+      <inkml:inkSource xml:id="inkSrc0">
+        <inkml:traceFormat>
+          <inkml:channel name="X" type="integer" min="-2.14748E9" max="2.14748E9" units="cm"/>
+          <inkml:channel name="Y" type="integer" min="-2.14748E9" max="2.14748E9" units="cm"/>
+          <inkml:channel name="F" type="integer" max="32767" units="dev"/>
+        </inkml:traceFormat>
+        <inkml:channelProperties>
+          <inkml:channelProperty channel="X" name="resolution" value="1000" units="1/cm"/>
+          <inkml:channelProperty channel="Y" name="resolution" value="1000" units="1/cm"/>
+          <inkml:channelProperty channel="F" name="resolution" value="0" units="1/dev"/>
+        </inkml:channelProperties>
+      </inkml:inkSource>
+      <inkml:timestamp xml:id="ts0" timeString="2025-10-02T13:01:45.207"/>
+    </inkml:context>
+    <inkml:brush xml:id="br0">
+      <inkml:brushProperty name="width" value="0.1" units="cm"/>
+      <inkml:brushProperty name="height" value="0.1" units="cm"/>
+      <inkml:brushProperty name="color" value="#FF0066"/>
+    </inkml:brush>
+  </inkml:definitions>
+  <inkml:trace contextRef="#ctx0" brushRef="#br0">1 47 24575,'171'-11'0,"-113"6"0,-52 4 0,20-1 0,44-10 0,-5 2-1365,-29 5-5461</inkml:trace>
+</inkml:ink>
+</file>
+
+<file path=ppt/ink/ink8.xml><?xml version="1.0" encoding="utf-8"?>
+<inkml:ink xmlns:inkml="http://www.w3.org/2003/InkML">
+  <inkml:definitions>
+    <inkml:context xml:id="ctx0">
+      <inkml:inkSource xml:id="inkSrc0">
+        <inkml:traceFormat>
+          <inkml:channel name="X" type="integer" min="-2.14748E9" max="2.14748E9" units="cm"/>
+          <inkml:channel name="Y" type="integer" min="-2.14748E9" max="2.14748E9" units="cm"/>
+          <inkml:channel name="F" type="integer" max="32767" units="dev"/>
+        </inkml:traceFormat>
+        <inkml:channelProperties>
+          <inkml:channelProperty channel="X" name="resolution" value="1000" units="1/cm"/>
+          <inkml:channelProperty channel="Y" name="resolution" value="1000" units="1/cm"/>
+          <inkml:channelProperty channel="F" name="resolution" value="0" units="1/dev"/>
+        </inkml:channelProperties>
+      </inkml:inkSource>
+      <inkml:timestamp xml:id="ts0" timeString="2025-10-02T13:04:13.873"/>
+    </inkml:context>
+    <inkml:brush xml:id="br0">
+      <inkml:brushProperty name="width" value="0.1" units="cm"/>
+      <inkml:brushProperty name="height" value="0.1" units="cm"/>
+      <inkml:brushProperty name="color" value="#FF0066"/>
+    </inkml:brush>
+  </inkml:definitions>
+  <inkml:trace contextRef="#ctx0" brushRef="#br0">1 195 24575,'0'-8'0,"0"0"0,0 0 0,1 0 0,0 0 0,1 0 0,0 0 0,4-10 0,-4 13 0,0 1 0,1-1 0,0 1 0,0 0 0,0 0 0,1 0 0,-1 0 0,1 0 0,0 1 0,0 0 0,0-1 0,7-2 0,23-22 0,-30 25 0,-1 0 0,1-1 0,0 1 0,0 0 0,0 1 0,0-1 0,0 1 0,0-1 0,1 1 0,-1 1 0,1-1 0,0 1 0,-1-1 0,1 1 0,5 0 0,49-2 0,94 8 0,-148-4 0,1-1 0,-1 1 0,0 1 0,0-1 0,1 1 0,-1 0 0,0 0 0,-1 0 0,1 1 0,0 0 0,-1 0 0,1 0 0,-1 0 0,0 1 0,0 0 0,0 0 0,-1 0 0,0 0 0,1 0 0,-1 1 0,-1-1 0,1 1 0,-1 0 0,1 0 0,1 6 0,1 6 0,-1 0 0,0 0 0,-1 0 0,-1 0 0,0 0 0,-2 26 0,0 9 0,-2 45 0,1-92 0,0 0 0,-1 0 0,0-1 0,0 1 0,0 0 0,-1-1 0,0 0 0,1 1 0,-1-1 0,-1 0 0,1-1 0,-1 1 0,1-1 0,-1 1 0,-6 3 0,4-2 0,0 0 0,1 0 0,-1 1 0,1 0 0,0 0 0,-5 9 0,3 1 0,1 1 0,1-1 0,0 1 0,2 0 0,0 0 0,0 0 0,1 20 0,0-15 0,2-19-114,0-1 1,-1 1-1,1-1 0,-1 0 0,1 0 1,-1 1-1,0-1 0,0 0 0,0 0 1,0 0-1,-3 4 0</inkml:trace>
+</inkml:ink>
+</file>
+
+<file path=ppt/ink/ink9.xml><?xml version="1.0" encoding="utf-8"?>
+<inkml:ink xmlns:inkml="http://www.w3.org/2003/InkML">
+  <inkml:definitions>
+    <inkml:context xml:id="ctx0">
+      <inkml:inkSource xml:id="inkSrc0">
+        <inkml:traceFormat>
+          <inkml:channel name="X" type="integer" min="-2.14748E9" max="2.14748E9" units="cm"/>
+          <inkml:channel name="Y" type="integer" min="-2.14748E9" max="2.14748E9" units="cm"/>
+          <inkml:channel name="F" type="integer" max="32767" units="dev"/>
+        </inkml:traceFormat>
+        <inkml:channelProperties>
+          <inkml:channelProperty channel="X" name="resolution" value="1000" units="1/cm"/>
+          <inkml:channelProperty channel="Y" name="resolution" value="1000" units="1/cm"/>
+          <inkml:channelProperty channel="F" name="resolution" value="0" units="1/dev"/>
+        </inkml:channelProperties>
+      </inkml:inkSource>
+      <inkml:timestamp xml:id="ts0" timeString="2025-10-02T13:04:16.906"/>
+    </inkml:context>
+    <inkml:brush xml:id="br0">
+      <inkml:brushProperty name="width" value="0.1" units="cm"/>
+      <inkml:brushProperty name="height" value="0.1" units="cm"/>
+      <inkml:brushProperty name="color" value="#FF0066"/>
+    </inkml:brush>
+  </inkml:definitions>
+  <inkml:trace contextRef="#ctx0" brushRef="#br0">138 0 24575,'0'8'0,"0"0"0,0 0 0,-1-1 0,0 1 0,-1 0 0,1-1 0,-2 0 0,1 1 0,-1-1 0,0 0 0,-6 11 0,-4 16 0,12-30 0,1-1 0,-1 0 0,0 1 0,0-1 0,-1 0 0,1 0 0,-1 0 0,0 0 0,1 0 0,-1 0 0,-1 0 0,1 0 0,0-1 0,-1 1 0,-4 3 0,3-3 0,1-1 0,0 0 0,1 1 0,-1 0 0,0 0 0,1 0 0,-1 0 0,1 0 0,0 0 0,0 0 0,0 1 0,1-1 0,-1 1 0,1 0 0,0-1 0,0 1 0,-1 5 0,0 8 0,1-1 0,1 1 0,1 16 0,0-20 0,-1 0 0,0 0 0,-1 1 0,-3 18 0,3-29-97,0 0-1,1 0 1,-1-1-1,0 1 1,-1 0-1,1 0 1,0-1-1,-1 1 1,0-1-1,1 1 1,-1-1-1,0 0 0,-4 4 1</inkml:trace>
+</inkml:ink>
+</file>
+
 <file path=ppt/notesMasters/notesMaster1.xml><?xml version="1.0" encoding="utf-8"?>
 <p:notesMaster xmlns:a="http://schemas.openxmlformats.org/drawingml/2006/main" xmlns:r="http://schemas.openxmlformats.org/officeDocument/2006/relationships" xmlns:p="http://schemas.openxmlformats.org/presentationml/2006/main">
   <p:cSld>
@@ -1438,7 +1414,7 @@
           <a:p>
             <a:fld id="{2A59A54D-A59E-4D85-AEC9-D5AFF867AB55}" type="datetimeFigureOut">
               <a:rPr lang="en-US" smtClean="0"/>
-              <a:t>6/2/2025</a:t>
+              <a:t>10/2/2025</a:t>
             </a:fld>
             <a:endParaRPr lang="en-US"/>
           </a:p>
@@ -1834,7 +1810,7 @@
           <a:p>
             <a:fld id="{4263717A-E3C1-4BED-ABE0-B7069385E023}" type="datetimeFigureOut">
               <a:rPr lang="en-US" smtClean="0"/>
-              <a:t>6/2/2025</a:t>
+              <a:t>10/2/2025</a:t>
             </a:fld>
             <a:endParaRPr lang="en-US"/>
           </a:p>
@@ -2007,7 +1983,7 @@
           <a:p>
             <a:fld id="{4263717A-E3C1-4BED-ABE0-B7069385E023}" type="datetimeFigureOut">
               <a:rPr lang="en-US" smtClean="0"/>
-              <a:t>6/2/2025</a:t>
+              <a:t>10/2/2025</a:t>
             </a:fld>
             <a:endParaRPr lang="en-US"/>
           </a:p>
@@ -2185,7 +2161,7 @@
           <a:p>
             <a:fld id="{4263717A-E3C1-4BED-ABE0-B7069385E023}" type="datetimeFigureOut">
               <a:rPr lang="en-US" smtClean="0"/>
-              <a:t>6/2/2025</a:t>
+              <a:t>10/2/2025</a:t>
             </a:fld>
             <a:endParaRPr lang="en-US"/>
           </a:p>
@@ -2353,7 +2329,7 @@
           <a:p>
             <a:fld id="{4263717A-E3C1-4BED-ABE0-B7069385E023}" type="datetimeFigureOut">
               <a:rPr lang="en-US" smtClean="0"/>
-              <a:t>6/2/2025</a:t>
+              <a:t>10/2/2025</a:t>
             </a:fld>
             <a:endParaRPr lang="en-US"/>
           </a:p>
@@ -2598,7 +2574,7 @@
           <a:p>
             <a:fld id="{4263717A-E3C1-4BED-ABE0-B7069385E023}" type="datetimeFigureOut">
               <a:rPr lang="en-US" smtClean="0"/>
-              <a:t>6/2/2025</a:t>
+              <a:t>10/2/2025</a:t>
             </a:fld>
             <a:endParaRPr lang="en-US"/>
           </a:p>
@@ -2827,7 +2803,7 @@
           <a:p>
             <a:fld id="{4263717A-E3C1-4BED-ABE0-B7069385E023}" type="datetimeFigureOut">
               <a:rPr lang="en-US" smtClean="0"/>
-              <a:t>6/2/2025</a:t>
+              <a:t>10/2/2025</a:t>
             </a:fld>
             <a:endParaRPr lang="en-US"/>
           </a:p>
@@ -3191,7 +3167,7 @@
           <a:p>
             <a:fld id="{4263717A-E3C1-4BED-ABE0-B7069385E023}" type="datetimeFigureOut">
               <a:rPr lang="en-US" smtClean="0"/>
-              <a:t>6/2/2025</a:t>
+              <a:t>10/2/2025</a:t>
             </a:fld>
             <a:endParaRPr lang="en-US"/>
           </a:p>
@@ -3308,7 +3284,7 @@
           <a:p>
             <a:fld id="{4263717A-E3C1-4BED-ABE0-B7069385E023}" type="datetimeFigureOut">
               <a:rPr lang="en-US" smtClean="0"/>
-              <a:t>6/2/2025</a:t>
+              <a:t>10/2/2025</a:t>
             </a:fld>
             <a:endParaRPr lang="en-US"/>
           </a:p>
@@ -3403,7 +3379,7 @@
           <a:p>
             <a:fld id="{4263717A-E3C1-4BED-ABE0-B7069385E023}" type="datetimeFigureOut">
               <a:rPr lang="en-US" smtClean="0"/>
-              <a:t>6/2/2025</a:t>
+              <a:t>10/2/2025</a:t>
             </a:fld>
             <a:endParaRPr lang="en-US"/>
           </a:p>
@@ -3678,7 +3654,7 @@
           <a:p>
             <a:fld id="{4263717A-E3C1-4BED-ABE0-B7069385E023}" type="datetimeFigureOut">
               <a:rPr lang="en-US" smtClean="0"/>
-              <a:t>6/2/2025</a:t>
+              <a:t>10/2/2025</a:t>
             </a:fld>
             <a:endParaRPr lang="en-US"/>
           </a:p>
@@ -3930,7 +3906,7 @@
           <a:p>
             <a:fld id="{4263717A-E3C1-4BED-ABE0-B7069385E023}" type="datetimeFigureOut">
               <a:rPr lang="en-US" smtClean="0"/>
-              <a:t>6/2/2025</a:t>
+              <a:t>10/2/2025</a:t>
             </a:fld>
             <a:endParaRPr lang="en-US"/>
           </a:p>
@@ -4149,7 +4125,7 @@
           <a:p>
             <a:fld id="{4263717A-E3C1-4BED-ABE0-B7069385E023}" type="datetimeFigureOut">
               <a:rPr lang="en-US" smtClean="0"/>
-              <a:t>6/2/2025</a:t>
+              <a:t>10/2/2025</a:t>
             </a:fld>
             <a:endParaRPr lang="en-US"/>
           </a:p>
@@ -4632,7 +4608,10 @@
           <a:bodyPr/>
           <a:lstStyle/>
           <a:p>
-            <a:endParaRPr lang="en-US" dirty="0"/>
+            <a:r>
+              <a:rPr lang="en-US" dirty="0"/>
+              <a:t>Categorical Prediction</a:t>
+            </a:r>
           </a:p>
         </p:txBody>
       </p:sp>
@@ -4684,12 +4663,22 @@
         </p:nvSpPr>
         <p:spPr/>
         <p:txBody>
-          <a:bodyPr/>
+          <a:bodyPr>
+            <a:normAutofit/>
+          </a:bodyPr>
           <a:lstStyle/>
           <a:p>
             <a:r>
               <a:rPr lang="en-US" dirty="0"/>
-              <a:t>Motivation</a:t>
+              <a:t>Motivation: Linear regression won’t work for </a:t>
+            </a:r>
+            <a:r>
+              <a:rPr lang="en-US" dirty="0">
+                <a:solidFill>
+                  <a:srgbClr val="FF0000"/>
+                </a:solidFill>
+              </a:rPr>
+              <a:t>Categorical Prediction</a:t>
             </a:r>
           </a:p>
         </p:txBody>
@@ -4888,6 +4877,507 @@
           </a:prstGeom>
         </p:spPr>
       </p:pic>
+      <mc:AlternateContent xmlns:mc="http://schemas.openxmlformats.org/markup-compatibility/2006">
+        <mc:Choice xmlns:p14="http://schemas.microsoft.com/office/powerpoint/2010/main" Requires="p14">
+          <p:contentPart p14:bwMode="auto" r:id="rId6">
+            <p14:nvContentPartPr>
+              <p14:cNvPr id="4" name="Ink 3">
+                <a:extLst>
+                  <a:ext uri="{FF2B5EF4-FFF2-40B4-BE49-F238E27FC236}">
+                    <a16:creationId xmlns:a16="http://schemas.microsoft.com/office/drawing/2014/main" id="{9C2440D9-6E2E-6089-2909-9E75D7C4526D}"/>
+                  </a:ext>
+                </a:extLst>
+              </p14:cNvPr>
+              <p14:cNvContentPartPr/>
+              <p14:nvPr/>
+            </p14:nvContentPartPr>
+            <p14:xfrm>
+              <a:off x="967422" y="1807770"/>
+              <a:ext cx="889200" cy="417240"/>
+            </p14:xfrm>
+          </p:contentPart>
+        </mc:Choice>
+        <mc:Fallback>
+          <p:pic>
+            <p:nvPicPr>
+              <p:cNvPr id="4" name="Ink 3">
+                <a:extLst>
+                  <a:ext uri="{FF2B5EF4-FFF2-40B4-BE49-F238E27FC236}">
+                    <a16:creationId xmlns:a16="http://schemas.microsoft.com/office/drawing/2014/main" id="{9C2440D9-6E2E-6089-2909-9E75D7C4526D}"/>
+                  </a:ext>
+                </a:extLst>
+              </p:cNvPr>
+              <p:cNvPicPr/>
+              <p:nvPr/>
+            </p:nvPicPr>
+            <p:blipFill>
+              <a:blip r:embed="rId7"/>
+              <a:stretch>
+                <a:fillRect/>
+              </a:stretch>
+            </p:blipFill>
+            <p:spPr>
+              <a:xfrm>
+                <a:off x="949422" y="1789770"/>
+                <a:ext cx="924840" cy="452880"/>
+              </a:xfrm>
+              <a:prstGeom prst="rect">
+                <a:avLst/>
+              </a:prstGeom>
+            </p:spPr>
+          </p:pic>
+        </mc:Fallback>
+      </mc:AlternateContent>
+      <mc:AlternateContent xmlns:mc="http://schemas.openxmlformats.org/markup-compatibility/2006">
+        <mc:Choice xmlns:p14="http://schemas.microsoft.com/office/powerpoint/2010/main" Requires="p14">
+          <p:contentPart p14:bwMode="auto" r:id="rId8">
+            <p14:nvContentPartPr>
+              <p14:cNvPr id="5" name="Ink 4">
+                <a:extLst>
+                  <a:ext uri="{FF2B5EF4-FFF2-40B4-BE49-F238E27FC236}">
+                    <a16:creationId xmlns:a16="http://schemas.microsoft.com/office/drawing/2014/main" id="{8595E725-A727-D1B9-3E31-0FAC9674EE4A}"/>
+                  </a:ext>
+                </a:extLst>
+              </p14:cNvPr>
+              <p14:cNvContentPartPr/>
+              <p14:nvPr/>
+            </p14:nvContentPartPr>
+            <p14:xfrm>
+              <a:off x="968142" y="4517490"/>
+              <a:ext cx="855720" cy="670680"/>
+            </p14:xfrm>
+          </p:contentPart>
+        </mc:Choice>
+        <mc:Fallback>
+          <p:pic>
+            <p:nvPicPr>
+              <p:cNvPr id="5" name="Ink 4">
+                <a:extLst>
+                  <a:ext uri="{FF2B5EF4-FFF2-40B4-BE49-F238E27FC236}">
+                    <a16:creationId xmlns:a16="http://schemas.microsoft.com/office/drawing/2014/main" id="{8595E725-A727-D1B9-3E31-0FAC9674EE4A}"/>
+                  </a:ext>
+                </a:extLst>
+              </p:cNvPr>
+              <p:cNvPicPr/>
+              <p:nvPr/>
+            </p:nvPicPr>
+            <p:blipFill>
+              <a:blip r:embed="rId9"/>
+              <a:stretch>
+                <a:fillRect/>
+              </a:stretch>
+            </p:blipFill>
+            <p:spPr>
+              <a:xfrm>
+                <a:off x="950142" y="4499490"/>
+                <a:ext cx="891360" cy="706320"/>
+              </a:xfrm>
+              <a:prstGeom prst="rect">
+                <a:avLst/>
+              </a:prstGeom>
+            </p:spPr>
+          </p:pic>
+        </mc:Fallback>
+      </mc:AlternateContent>
+      <p:grpSp>
+        <p:nvGrpSpPr>
+          <p:cNvPr id="15" name="Group 14">
+            <a:extLst>
+              <a:ext uri="{FF2B5EF4-FFF2-40B4-BE49-F238E27FC236}">
+                <a16:creationId xmlns:a16="http://schemas.microsoft.com/office/drawing/2014/main" id="{A8923A0E-2CD8-2329-7841-5AC4DFC253EA}"/>
+              </a:ext>
+            </a:extLst>
+          </p:cNvPr>
+          <p:cNvGrpSpPr/>
+          <p:nvPr/>
+        </p:nvGrpSpPr>
+        <p:grpSpPr>
+          <a:xfrm>
+            <a:off x="1794342" y="1624530"/>
+            <a:ext cx="793440" cy="2940480"/>
+            <a:chOff x="1794342" y="1624530"/>
+            <a:chExt cx="793440" cy="2940480"/>
+          </a:xfrm>
+        </p:grpSpPr>
+        <mc:AlternateContent xmlns:mc="http://schemas.openxmlformats.org/markup-compatibility/2006">
+          <mc:Choice xmlns:p14="http://schemas.microsoft.com/office/powerpoint/2010/main" Requires="p14">
+            <p:contentPart p14:bwMode="auto" r:id="rId10">
+              <p14:nvContentPartPr>
+                <p14:cNvPr id="6" name="Ink 5">
+                  <a:extLst>
+                    <a:ext uri="{FF2B5EF4-FFF2-40B4-BE49-F238E27FC236}">
+                      <a16:creationId xmlns:a16="http://schemas.microsoft.com/office/drawing/2014/main" id="{31468C0A-227B-698D-9452-4265790B3758}"/>
+                    </a:ext>
+                  </a:extLst>
+                </p14:cNvPr>
+                <p14:cNvContentPartPr/>
+                <p14:nvPr/>
+              </p14:nvContentPartPr>
+              <p14:xfrm>
+                <a:off x="1794342" y="1624530"/>
+                <a:ext cx="164520" cy="293040"/>
+              </p14:xfrm>
+            </p:contentPart>
+          </mc:Choice>
+          <mc:Fallback>
+            <p:pic>
+              <p:nvPicPr>
+                <p:cNvPr id="6" name="Ink 5">
+                  <a:extLst>
+                    <a:ext uri="{FF2B5EF4-FFF2-40B4-BE49-F238E27FC236}">
+                      <a16:creationId xmlns:a16="http://schemas.microsoft.com/office/drawing/2014/main" id="{31468C0A-227B-698D-9452-4265790B3758}"/>
+                    </a:ext>
+                  </a:extLst>
+                </p:cNvPr>
+                <p:cNvPicPr/>
+                <p:nvPr/>
+              </p:nvPicPr>
+              <p:blipFill>
+                <a:blip r:embed="rId11"/>
+                <a:stretch>
+                  <a:fillRect/>
+                </a:stretch>
+              </p:blipFill>
+              <p:spPr>
+                <a:xfrm>
+                  <a:off x="1776702" y="1606890"/>
+                  <a:ext cx="200160" cy="328680"/>
+                </a:xfrm>
+                <a:prstGeom prst="rect">
+                  <a:avLst/>
+                </a:prstGeom>
+              </p:spPr>
+            </p:pic>
+          </mc:Fallback>
+        </mc:AlternateContent>
+        <mc:AlternateContent xmlns:mc="http://schemas.openxmlformats.org/markup-compatibility/2006">
+          <mc:Choice xmlns:p14="http://schemas.microsoft.com/office/powerpoint/2010/main" Requires="p14">
+            <p:contentPart p14:bwMode="auto" r:id="rId12">
+              <p14:nvContentPartPr>
+                <p14:cNvPr id="8" name="Ink 7">
+                  <a:extLst>
+                    <a:ext uri="{FF2B5EF4-FFF2-40B4-BE49-F238E27FC236}">
+                      <a16:creationId xmlns:a16="http://schemas.microsoft.com/office/drawing/2014/main" id="{68E4FE6D-3D86-CD72-3B5F-24F1F1666FC2}"/>
+                    </a:ext>
+                  </a:extLst>
+                </p14:cNvPr>
+                <p14:cNvContentPartPr/>
+                <p14:nvPr/>
+              </p14:nvContentPartPr>
+              <p14:xfrm>
+                <a:off x="1958142" y="1650810"/>
+                <a:ext cx="79920" cy="10440"/>
+              </p14:xfrm>
+            </p:contentPart>
+          </mc:Choice>
+          <mc:Fallback>
+            <p:pic>
+              <p:nvPicPr>
+                <p:cNvPr id="8" name="Ink 7">
+                  <a:extLst>
+                    <a:ext uri="{FF2B5EF4-FFF2-40B4-BE49-F238E27FC236}">
+                      <a16:creationId xmlns:a16="http://schemas.microsoft.com/office/drawing/2014/main" id="{68E4FE6D-3D86-CD72-3B5F-24F1F1666FC2}"/>
+                    </a:ext>
+                  </a:extLst>
+                </p:cNvPr>
+                <p:cNvPicPr/>
+                <p:nvPr/>
+              </p:nvPicPr>
+              <p:blipFill>
+                <a:blip r:embed="rId13"/>
+                <a:stretch>
+                  <a:fillRect/>
+                </a:stretch>
+              </p:blipFill>
+              <p:spPr>
+                <a:xfrm>
+                  <a:off x="1940502" y="1633170"/>
+                  <a:ext cx="115560" cy="46080"/>
+                </a:xfrm>
+                <a:prstGeom prst="rect">
+                  <a:avLst/>
+                </a:prstGeom>
+              </p:spPr>
+            </p:pic>
+          </mc:Fallback>
+        </mc:AlternateContent>
+        <mc:AlternateContent xmlns:mc="http://schemas.openxmlformats.org/markup-compatibility/2006">
+          <mc:Choice xmlns:p14="http://schemas.microsoft.com/office/powerpoint/2010/main" Requires="p14">
+            <p:contentPart p14:bwMode="auto" r:id="rId14">
+              <p14:nvContentPartPr>
+                <p14:cNvPr id="12" name="Ink 11">
+                  <a:extLst>
+                    <a:ext uri="{FF2B5EF4-FFF2-40B4-BE49-F238E27FC236}">
+                      <a16:creationId xmlns:a16="http://schemas.microsoft.com/office/drawing/2014/main" id="{DA552570-154F-3A62-388D-8D0DEB001008}"/>
+                    </a:ext>
+                  </a:extLst>
+                </p14:cNvPr>
+                <p14:cNvContentPartPr/>
+                <p14:nvPr/>
+              </p14:nvContentPartPr>
+              <p14:xfrm>
+                <a:off x="1808382" y="1691850"/>
+                <a:ext cx="779400" cy="2873160"/>
+              </p14:xfrm>
+            </p:contentPart>
+          </mc:Choice>
+          <mc:Fallback>
+            <p:pic>
+              <p:nvPicPr>
+                <p:cNvPr id="12" name="Ink 11">
+                  <a:extLst>
+                    <a:ext uri="{FF2B5EF4-FFF2-40B4-BE49-F238E27FC236}">
+                      <a16:creationId xmlns:a16="http://schemas.microsoft.com/office/drawing/2014/main" id="{DA552570-154F-3A62-388D-8D0DEB001008}"/>
+                    </a:ext>
+                  </a:extLst>
+                </p:cNvPr>
+                <p:cNvPicPr/>
+                <p:nvPr/>
+              </p:nvPicPr>
+              <p:blipFill>
+                <a:blip r:embed="rId15"/>
+                <a:stretch>
+                  <a:fillRect/>
+                </a:stretch>
+              </p:blipFill>
+              <p:spPr>
+                <a:xfrm>
+                  <a:off x="1790382" y="1674210"/>
+                  <a:ext cx="815040" cy="2908800"/>
+                </a:xfrm>
+                <a:prstGeom prst="rect">
+                  <a:avLst/>
+                </a:prstGeom>
+              </p:spPr>
+            </p:pic>
+          </mc:Fallback>
+        </mc:AlternateContent>
+        <mc:AlternateContent xmlns:mc="http://schemas.openxmlformats.org/markup-compatibility/2006">
+          <mc:Choice xmlns:p14="http://schemas.microsoft.com/office/powerpoint/2010/main" Requires="p14">
+            <p:contentPart p14:bwMode="auto" r:id="rId16">
+              <p14:nvContentPartPr>
+                <p14:cNvPr id="14" name="Ink 13">
+                  <a:extLst>
+                    <a:ext uri="{FF2B5EF4-FFF2-40B4-BE49-F238E27FC236}">
+                      <a16:creationId xmlns:a16="http://schemas.microsoft.com/office/drawing/2014/main" id="{C6D5C2EE-6613-1CFF-8BA2-0585FB184FEF}"/>
+                    </a:ext>
+                  </a:extLst>
+                </p14:cNvPr>
+                <p14:cNvContentPartPr/>
+                <p14:nvPr/>
+              </p14:nvContentPartPr>
+              <p14:xfrm>
+                <a:off x="2374662" y="1695810"/>
+                <a:ext cx="156240" cy="17280"/>
+              </p14:xfrm>
+            </p:contentPart>
+          </mc:Choice>
+          <mc:Fallback>
+            <p:pic>
+              <p:nvPicPr>
+                <p:cNvPr id="14" name="Ink 13">
+                  <a:extLst>
+                    <a:ext uri="{FF2B5EF4-FFF2-40B4-BE49-F238E27FC236}">
+                      <a16:creationId xmlns:a16="http://schemas.microsoft.com/office/drawing/2014/main" id="{C6D5C2EE-6613-1CFF-8BA2-0585FB184FEF}"/>
+                    </a:ext>
+                  </a:extLst>
+                </p:cNvPr>
+                <p:cNvPicPr/>
+                <p:nvPr/>
+              </p:nvPicPr>
+              <p:blipFill>
+                <a:blip r:embed="rId17"/>
+                <a:stretch>
+                  <a:fillRect/>
+                </a:stretch>
+              </p:blipFill>
+              <p:spPr>
+                <a:xfrm>
+                  <a:off x="2357022" y="1678170"/>
+                  <a:ext cx="191880" cy="52920"/>
+                </a:xfrm>
+                <a:prstGeom prst="rect">
+                  <a:avLst/>
+                </a:prstGeom>
+              </p:spPr>
+            </p:pic>
+          </mc:Fallback>
+        </mc:AlternateContent>
+      </p:grpSp>
+      <mc:AlternateContent xmlns:mc="http://schemas.openxmlformats.org/markup-compatibility/2006">
+        <mc:Choice xmlns:p14="http://schemas.microsoft.com/office/powerpoint/2010/main" Requires="p14">
+          <p:contentPart p14:bwMode="auto" r:id="rId18">
+            <p14:nvContentPartPr>
+              <p14:cNvPr id="16" name="Ink 15">
+                <a:extLst>
+                  <a:ext uri="{FF2B5EF4-FFF2-40B4-BE49-F238E27FC236}">
+                    <a16:creationId xmlns:a16="http://schemas.microsoft.com/office/drawing/2014/main" id="{7AEEF1F1-BF07-0208-02F7-12EDE77EBF4F}"/>
+                  </a:ext>
+                </a:extLst>
+              </p14:cNvPr>
+              <p14:cNvContentPartPr/>
+              <p14:nvPr/>
+            </p14:nvContentPartPr>
+            <p14:xfrm>
+              <a:off x="6057660" y="2787300"/>
+              <a:ext cx="183960" cy="256680"/>
+            </p14:xfrm>
+          </p:contentPart>
+        </mc:Choice>
+        <mc:Fallback>
+          <p:pic>
+            <p:nvPicPr>
+              <p:cNvPr id="16" name="Ink 15">
+                <a:extLst>
+                  <a:ext uri="{FF2B5EF4-FFF2-40B4-BE49-F238E27FC236}">
+                    <a16:creationId xmlns:a16="http://schemas.microsoft.com/office/drawing/2014/main" id="{7AEEF1F1-BF07-0208-02F7-12EDE77EBF4F}"/>
+                  </a:ext>
+                </a:extLst>
+              </p:cNvPr>
+              <p:cNvPicPr/>
+              <p:nvPr/>
+            </p:nvPicPr>
+            <p:blipFill>
+              <a:blip r:embed="rId19"/>
+              <a:stretch>
+                <a:fillRect/>
+              </a:stretch>
+            </p:blipFill>
+            <p:spPr>
+              <a:xfrm>
+                <a:off x="6040020" y="2769300"/>
+                <a:ext cx="219600" cy="292320"/>
+              </a:xfrm>
+              <a:prstGeom prst="rect">
+                <a:avLst/>
+              </a:prstGeom>
+            </p:spPr>
+          </p:pic>
+        </mc:Fallback>
+      </mc:AlternateContent>
+      <p:grpSp>
+        <p:nvGrpSpPr>
+          <p:cNvPr id="19" name="Group 18">
+            <a:extLst>
+              <a:ext uri="{FF2B5EF4-FFF2-40B4-BE49-F238E27FC236}">
+                <a16:creationId xmlns:a16="http://schemas.microsoft.com/office/drawing/2014/main" id="{184B4CA9-6B41-4477-C78C-899DECF3BE93}"/>
+              </a:ext>
+            </a:extLst>
+          </p:cNvPr>
+          <p:cNvGrpSpPr/>
+          <p:nvPr/>
+        </p:nvGrpSpPr>
+        <p:grpSpPr>
+          <a:xfrm>
+            <a:off x="6133620" y="3017340"/>
+            <a:ext cx="61560" cy="318240"/>
+            <a:chOff x="6133620" y="3017340"/>
+            <a:chExt cx="61560" cy="318240"/>
+          </a:xfrm>
+        </p:grpSpPr>
+        <mc:AlternateContent xmlns:mc="http://schemas.openxmlformats.org/markup-compatibility/2006">
+          <mc:Choice xmlns:p14="http://schemas.microsoft.com/office/powerpoint/2010/main" Requires="p14">
+            <p:contentPart p14:bwMode="auto" r:id="rId20">
+              <p14:nvContentPartPr>
+                <p14:cNvPr id="17" name="Ink 16">
+                  <a:extLst>
+                    <a:ext uri="{FF2B5EF4-FFF2-40B4-BE49-F238E27FC236}">
+                      <a16:creationId xmlns:a16="http://schemas.microsoft.com/office/drawing/2014/main" id="{598177DD-A50C-2191-0906-A8AEE8D72AA9}"/>
+                    </a:ext>
+                  </a:extLst>
+                </p14:cNvPr>
+                <p14:cNvContentPartPr/>
+                <p14:nvPr/>
+              </p14:nvContentPartPr>
+              <p14:xfrm>
+                <a:off x="6137940" y="3017340"/>
+                <a:ext cx="49680" cy="164880"/>
+              </p14:xfrm>
+            </p:contentPart>
+          </mc:Choice>
+          <mc:Fallback>
+            <p:pic>
+              <p:nvPicPr>
+                <p:cNvPr id="17" name="Ink 16">
+                  <a:extLst>
+                    <a:ext uri="{FF2B5EF4-FFF2-40B4-BE49-F238E27FC236}">
+                      <a16:creationId xmlns:a16="http://schemas.microsoft.com/office/drawing/2014/main" id="{598177DD-A50C-2191-0906-A8AEE8D72AA9}"/>
+                    </a:ext>
+                  </a:extLst>
+                </p:cNvPr>
+                <p:cNvPicPr/>
+                <p:nvPr/>
+              </p:nvPicPr>
+              <p:blipFill>
+                <a:blip r:embed="rId21"/>
+                <a:stretch>
+                  <a:fillRect/>
+                </a:stretch>
+              </p:blipFill>
+              <p:spPr>
+                <a:xfrm>
+                  <a:off x="6120300" y="2999340"/>
+                  <a:ext cx="85320" cy="200520"/>
+                </a:xfrm>
+                <a:prstGeom prst="rect">
+                  <a:avLst/>
+                </a:prstGeom>
+              </p:spPr>
+            </p:pic>
+          </mc:Fallback>
+        </mc:AlternateContent>
+        <mc:AlternateContent xmlns:mc="http://schemas.openxmlformats.org/markup-compatibility/2006">
+          <mc:Choice xmlns:p14="http://schemas.microsoft.com/office/powerpoint/2010/main" Requires="p14">
+            <p:contentPart p14:bwMode="auto" r:id="rId22">
+              <p14:nvContentPartPr>
+                <p14:cNvPr id="18" name="Ink 17">
+                  <a:extLst>
+                    <a:ext uri="{FF2B5EF4-FFF2-40B4-BE49-F238E27FC236}">
+                      <a16:creationId xmlns:a16="http://schemas.microsoft.com/office/drawing/2014/main" id="{6E987ADE-1C05-DB61-A6DB-905AD6AE3B1C}"/>
+                    </a:ext>
+                  </a:extLst>
+                </p14:cNvPr>
+                <p14:cNvContentPartPr/>
+                <p14:nvPr/>
+              </p14:nvContentPartPr>
+              <p14:xfrm>
+                <a:off x="6133620" y="3280500"/>
+                <a:ext cx="61560" cy="55080"/>
+              </p14:xfrm>
+            </p:contentPart>
+          </mc:Choice>
+          <mc:Fallback>
+            <p:pic>
+              <p:nvPicPr>
+                <p:cNvPr id="18" name="Ink 17">
+                  <a:extLst>
+                    <a:ext uri="{FF2B5EF4-FFF2-40B4-BE49-F238E27FC236}">
+                      <a16:creationId xmlns:a16="http://schemas.microsoft.com/office/drawing/2014/main" id="{6E987ADE-1C05-DB61-A6DB-905AD6AE3B1C}"/>
+                    </a:ext>
+                  </a:extLst>
+                </p:cNvPr>
+                <p:cNvPicPr/>
+                <p:nvPr/>
+              </p:nvPicPr>
+              <p:blipFill>
+                <a:blip r:embed="rId23"/>
+                <a:stretch>
+                  <a:fillRect/>
+                </a:stretch>
+              </p:blipFill>
+              <p:spPr>
+                <a:xfrm>
+                  <a:off x="6115980" y="3262860"/>
+                  <a:ext cx="97200" cy="90720"/>
+                </a:xfrm>
+                <a:prstGeom prst="rect">
+                  <a:avLst/>
+                </a:prstGeom>
+              </p:spPr>
+            </p:pic>
+          </mc:Fallback>
+        </mc:AlternateContent>
+      </p:grpSp>
     </p:spTree>
     <p:extLst>
       <p:ext uri="{BB962C8B-B14F-4D97-AF65-F5344CB8AC3E}">
@@ -5990,8 +6480,8 @@
         </p:nvSpPr>
         <p:spPr>
           <a:xfrm>
-            <a:off x="1304790" y="3318871"/>
-            <a:ext cx="5333903" cy="2539236"/>
+            <a:off x="1950720" y="3318871"/>
+            <a:ext cx="4687973" cy="2539236"/>
           </a:xfrm>
           <a:custGeom>
             <a:avLst/>
@@ -6201,12 +6691,29 @@
         </p:nvSpPr>
         <p:spPr/>
         <p:txBody>
-          <a:bodyPr/>
+          <a:bodyPr>
+            <a:normAutofit fontScale="90000"/>
+          </a:bodyPr>
           <a:lstStyle/>
           <a:p>
             <a:r>
               <a:rPr lang="en-US" dirty="0"/>
-              <a:t>MSE does not work with Logistic Regression</a:t>
+              <a:t>MSE does not work with </a:t>
+            </a:r>
+            <a:r>
+              <a:rPr lang="en-US" dirty="0">
+                <a:solidFill>
+                  <a:srgbClr val="FF0000"/>
+                </a:solidFill>
+              </a:rPr>
+              <a:t>categorical predictors</a:t>
+            </a:r>
+            <a:br>
+              <a:rPr lang="en-US" u="sng" dirty="0"/>
+            </a:br>
+            <a:r>
+              <a:rPr lang="en-US" dirty="0"/>
+              <a:t>(Logistic Regression)</a:t>
             </a:r>
           </a:p>
         </p:txBody>

</xml_diff>